<commit_message>
added 6-intro to data collection systems
</commit_message>
<xml_diff>
--- a/public/Exam Notes/6-Introduction to data collection systems.pptx
+++ b/public/Exam Notes/6-Introduction to data collection systems.pptx
@@ -10,16 +10,20 @@
   <p:sldIdLst>
     <p:sldId id="256" r:id="rId6"/>
     <p:sldId id="257" r:id="rId7"/>
+    <p:sldId id="258" r:id="rId8"/>
+    <p:sldId id="259" r:id="rId9"/>
+    <p:sldId id="260" r:id="rId10"/>
+    <p:sldId id="261" r:id="rId11"/>
   </p:sldIdLst>
   <p:sldSz cy="5143500" cx="9144000"/>
   <p:notesSz cx="6858000" cy="9144000"/>
   <p:embeddedFontLst>
     <p:embeddedFont>
       <p:font typeface="Open Sans"/>
-      <p:regular r:id="rId8"/>
-      <p:bold r:id="rId9"/>
-      <p:italic r:id="rId10"/>
-      <p:boldItalic r:id="rId11"/>
+      <p:regular r:id="rId12"/>
+      <p:bold r:id="rId13"/>
+      <p:italic r:id="rId14"/>
+      <p:boldItalic r:id="rId15"/>
     </p:embeddedFont>
   </p:embeddedFontLst>
   <p:defaultTextStyle>
@@ -1013,6 +1017,474 @@
       <p:sp>
         <p:nvSpPr>
           <p:cNvPr id="62" name="Google Shape;62;p1:notes"/>
+          <p:cNvSpPr txBox="1"/>
+          <p:nvPr>
+            <p:ph idx="1" type="body"/>
+          </p:nvPr>
+        </p:nvSpPr>
+        <p:spPr>
+          <a:xfrm>
+            <a:off x="685800" y="4343400"/>
+            <a:ext cx="5486400" cy="4114800"/>
+          </a:xfrm>
+          <a:prstGeom prst="rect">
+            <a:avLst/>
+          </a:prstGeom>
+          <a:noFill/>
+          <a:ln>
+            <a:noFill/>
+          </a:ln>
+        </p:spPr>
+        <p:txBody>
+          <a:bodyPr anchorCtr="0" anchor="t" bIns="91425" lIns="91425" spcFirstLastPara="1" rIns="91425" wrap="square" tIns="91425">
+            <a:noAutofit/>
+          </a:bodyPr>
+          <a:lstStyle/>
+          <a:p>
+            <a:pPr indent="0" lvl="0" marL="0" rtl="0" algn="l">
+              <a:lnSpc>
+                <a:spcPct val="100000"/>
+              </a:lnSpc>
+              <a:spcBef>
+                <a:spcPts val="0"/>
+              </a:spcBef>
+              <a:spcAft>
+                <a:spcPts val="0"/>
+              </a:spcAft>
+              <a:buSzPts val="1100"/>
+              <a:buNone/>
+            </a:pPr>
+            <a:r>
+              <a:t/>
+            </a:r>
+            <a:endParaRPr/>
+          </a:p>
+        </p:txBody>
+      </p:sp>
+    </p:spTree>
+  </p:cSld>
+  <p:clrMapOvr>
+    <a:masterClrMapping/>
+  </p:clrMapOvr>
+</p:notes>
+</file>
+
+<file path=ppt/notesSlides/notesSlide3.xml><?xml version="1.0" encoding="utf-8"?>
+<p:notes xmlns:a="http://schemas.openxmlformats.org/drawingml/2006/main" xmlns:r="http://schemas.openxmlformats.org/officeDocument/2006/relationships" xmlns:mc="http://schemas.openxmlformats.org/markup-compatibility/2006" xmlns:mv="urn:schemas-microsoft-com:mac:vml" xmlns:p="http://schemas.openxmlformats.org/presentationml/2006/main" xmlns:c="http://schemas.openxmlformats.org/drawingml/2006/chart" xmlns:dgm="http://schemas.openxmlformats.org/drawingml/2006/diagram" xmlns:o="urn:schemas-microsoft-com:office:office" xmlns:v="urn:schemas-microsoft-com:vml" xmlns:pvml="urn:schemas-microsoft-com:office:powerpoint" xmlns:com="http://schemas.openxmlformats.org/drawingml/2006/compatibility" xmlns:p14="http://schemas.microsoft.com/office/powerpoint/2010/main" xmlns:p15="http://schemas.microsoft.com/office/powerpoint/2012/main" showMasterPhAnim="0" showMasterSp="0">
+  <p:cSld>
+    <p:spTree>
+      <p:nvGrpSpPr>
+        <p:cNvPr id="78" name="Shape 78"/>
+        <p:cNvGrpSpPr/>
+        <p:nvPr/>
+      </p:nvGrpSpPr>
+      <p:grpSpPr>
+        <a:xfrm>
+          <a:off x="0" y="0"/>
+          <a:ext cx="0" cy="0"/>
+          <a:chOff x="0" y="0"/>
+          <a:chExt cx="0" cy="0"/>
+        </a:xfrm>
+      </p:grpSpPr>
+      <p:sp>
+        <p:nvSpPr>
+          <p:cNvPr id="79" name="Google Shape;79;g8bc219c924_1_79:notes"/>
+          <p:cNvSpPr/>
+          <p:nvPr>
+            <p:ph idx="2" type="sldImg"/>
+          </p:nvPr>
+        </p:nvSpPr>
+        <p:spPr>
+          <a:xfrm>
+            <a:off x="381300" y="685800"/>
+            <a:ext cx="6096000" cy="3429000"/>
+          </a:xfrm>
+          <a:custGeom>
+            <a:rect b="b" l="l" r="r" t="t"/>
+            <a:pathLst>
+              <a:path extrusionOk="0" h="120000" w="120000">
+                <a:moveTo>
+                  <a:pt x="0" y="0"/>
+                </a:moveTo>
+                <a:lnTo>
+                  <a:pt x="120000" y="0"/>
+                </a:lnTo>
+                <a:lnTo>
+                  <a:pt x="120000" y="120000"/>
+                </a:lnTo>
+                <a:lnTo>
+                  <a:pt x="0" y="120000"/>
+                </a:lnTo>
+                <a:close/>
+              </a:path>
+            </a:pathLst>
+          </a:custGeom>
+          <a:noFill/>
+          <a:ln cap="flat" cmpd="sng" w="9525">
+            <a:solidFill>
+              <a:srgbClr val="000000"/>
+            </a:solidFill>
+            <a:prstDash val="solid"/>
+            <a:round/>
+            <a:headEnd len="sm" w="sm" type="none"/>
+            <a:tailEnd len="sm" w="sm" type="none"/>
+          </a:ln>
+        </p:spPr>
+      </p:sp>
+      <p:sp>
+        <p:nvSpPr>
+          <p:cNvPr id="80" name="Google Shape;80;g8bc219c924_1_79:notes"/>
+          <p:cNvSpPr txBox="1"/>
+          <p:nvPr>
+            <p:ph idx="1" type="body"/>
+          </p:nvPr>
+        </p:nvSpPr>
+        <p:spPr>
+          <a:xfrm>
+            <a:off x="685800" y="4343400"/>
+            <a:ext cx="5486400" cy="4114800"/>
+          </a:xfrm>
+          <a:prstGeom prst="rect">
+            <a:avLst/>
+          </a:prstGeom>
+          <a:noFill/>
+          <a:ln>
+            <a:noFill/>
+          </a:ln>
+        </p:spPr>
+        <p:txBody>
+          <a:bodyPr anchorCtr="0" anchor="t" bIns="91425" lIns="91425" spcFirstLastPara="1" rIns="91425" wrap="square" tIns="91425">
+            <a:noAutofit/>
+          </a:bodyPr>
+          <a:lstStyle/>
+          <a:p>
+            <a:pPr indent="0" lvl="0" marL="0" rtl="0" algn="l">
+              <a:lnSpc>
+                <a:spcPct val="100000"/>
+              </a:lnSpc>
+              <a:spcBef>
+                <a:spcPts val="0"/>
+              </a:spcBef>
+              <a:spcAft>
+                <a:spcPts val="0"/>
+              </a:spcAft>
+              <a:buSzPts val="1100"/>
+              <a:buNone/>
+            </a:pPr>
+            <a:r>
+              <a:t/>
+            </a:r>
+            <a:endParaRPr/>
+          </a:p>
+        </p:txBody>
+      </p:sp>
+    </p:spTree>
+  </p:cSld>
+  <p:clrMapOvr>
+    <a:masterClrMapping/>
+  </p:clrMapOvr>
+</p:notes>
+</file>
+
+<file path=ppt/notesSlides/notesSlide4.xml><?xml version="1.0" encoding="utf-8"?>
+<p:notes xmlns:a="http://schemas.openxmlformats.org/drawingml/2006/main" xmlns:r="http://schemas.openxmlformats.org/officeDocument/2006/relationships" xmlns:mc="http://schemas.openxmlformats.org/markup-compatibility/2006" xmlns:mv="urn:schemas-microsoft-com:mac:vml" xmlns:p="http://schemas.openxmlformats.org/presentationml/2006/main" xmlns:c="http://schemas.openxmlformats.org/drawingml/2006/chart" xmlns:dgm="http://schemas.openxmlformats.org/drawingml/2006/diagram" xmlns:o="urn:schemas-microsoft-com:office:office" xmlns:v="urn:schemas-microsoft-com:vml" xmlns:pvml="urn:schemas-microsoft-com:office:powerpoint" xmlns:com="http://schemas.openxmlformats.org/drawingml/2006/compatibility" xmlns:p14="http://schemas.microsoft.com/office/powerpoint/2010/main" xmlns:p15="http://schemas.microsoft.com/office/powerpoint/2012/main" showMasterPhAnim="0" showMasterSp="0">
+  <p:cSld>
+    <p:spTree>
+      <p:nvGrpSpPr>
+        <p:cNvPr id="92" name="Shape 92"/>
+        <p:cNvGrpSpPr/>
+        <p:nvPr/>
+      </p:nvGrpSpPr>
+      <p:grpSpPr>
+        <a:xfrm>
+          <a:off x="0" y="0"/>
+          <a:ext cx="0" cy="0"/>
+          <a:chOff x="0" y="0"/>
+          <a:chExt cx="0" cy="0"/>
+        </a:xfrm>
+      </p:grpSpPr>
+      <p:sp>
+        <p:nvSpPr>
+          <p:cNvPr id="93" name="Google Shape;93;g8bc219c924_1_96:notes"/>
+          <p:cNvSpPr/>
+          <p:nvPr>
+            <p:ph idx="2" type="sldImg"/>
+          </p:nvPr>
+        </p:nvSpPr>
+        <p:spPr>
+          <a:xfrm>
+            <a:off x="381300" y="685800"/>
+            <a:ext cx="6096000" cy="3429000"/>
+          </a:xfrm>
+          <a:custGeom>
+            <a:rect b="b" l="l" r="r" t="t"/>
+            <a:pathLst>
+              <a:path extrusionOk="0" h="120000" w="120000">
+                <a:moveTo>
+                  <a:pt x="0" y="0"/>
+                </a:moveTo>
+                <a:lnTo>
+                  <a:pt x="120000" y="0"/>
+                </a:lnTo>
+                <a:lnTo>
+                  <a:pt x="120000" y="120000"/>
+                </a:lnTo>
+                <a:lnTo>
+                  <a:pt x="0" y="120000"/>
+                </a:lnTo>
+                <a:close/>
+              </a:path>
+            </a:pathLst>
+          </a:custGeom>
+          <a:noFill/>
+          <a:ln cap="flat" cmpd="sng" w="9525">
+            <a:solidFill>
+              <a:srgbClr val="000000"/>
+            </a:solidFill>
+            <a:prstDash val="solid"/>
+            <a:round/>
+            <a:headEnd len="sm" w="sm" type="none"/>
+            <a:tailEnd len="sm" w="sm" type="none"/>
+          </a:ln>
+        </p:spPr>
+      </p:sp>
+      <p:sp>
+        <p:nvSpPr>
+          <p:cNvPr id="94" name="Google Shape;94;g8bc219c924_1_96:notes"/>
+          <p:cNvSpPr txBox="1"/>
+          <p:nvPr>
+            <p:ph idx="1" type="body"/>
+          </p:nvPr>
+        </p:nvSpPr>
+        <p:spPr>
+          <a:xfrm>
+            <a:off x="685800" y="4343400"/>
+            <a:ext cx="5486400" cy="4114800"/>
+          </a:xfrm>
+          <a:prstGeom prst="rect">
+            <a:avLst/>
+          </a:prstGeom>
+          <a:noFill/>
+          <a:ln>
+            <a:noFill/>
+          </a:ln>
+        </p:spPr>
+        <p:txBody>
+          <a:bodyPr anchorCtr="0" anchor="t" bIns="91425" lIns="91425" spcFirstLastPara="1" rIns="91425" wrap="square" tIns="91425">
+            <a:noAutofit/>
+          </a:bodyPr>
+          <a:lstStyle/>
+          <a:p>
+            <a:pPr indent="0" lvl="0" marL="0" rtl="0" algn="l">
+              <a:lnSpc>
+                <a:spcPct val="100000"/>
+              </a:lnSpc>
+              <a:spcBef>
+                <a:spcPts val="0"/>
+              </a:spcBef>
+              <a:spcAft>
+                <a:spcPts val="0"/>
+              </a:spcAft>
+              <a:buSzPts val="1100"/>
+              <a:buNone/>
+            </a:pPr>
+            <a:r>
+              <a:t/>
+            </a:r>
+            <a:endParaRPr/>
+          </a:p>
+        </p:txBody>
+      </p:sp>
+    </p:spTree>
+  </p:cSld>
+  <p:clrMapOvr>
+    <a:masterClrMapping/>
+  </p:clrMapOvr>
+</p:notes>
+</file>
+
+<file path=ppt/notesSlides/notesSlide5.xml><?xml version="1.0" encoding="utf-8"?>
+<p:notes xmlns:a="http://schemas.openxmlformats.org/drawingml/2006/main" xmlns:r="http://schemas.openxmlformats.org/officeDocument/2006/relationships" xmlns:mc="http://schemas.openxmlformats.org/markup-compatibility/2006" xmlns:mv="urn:schemas-microsoft-com:mac:vml" xmlns:p="http://schemas.openxmlformats.org/presentationml/2006/main" xmlns:c="http://schemas.openxmlformats.org/drawingml/2006/chart" xmlns:dgm="http://schemas.openxmlformats.org/drawingml/2006/diagram" xmlns:o="urn:schemas-microsoft-com:office:office" xmlns:v="urn:schemas-microsoft-com:vml" xmlns:pvml="urn:schemas-microsoft-com:office:powerpoint" xmlns:com="http://schemas.openxmlformats.org/drawingml/2006/compatibility" xmlns:p14="http://schemas.microsoft.com/office/powerpoint/2010/main" xmlns:p15="http://schemas.microsoft.com/office/powerpoint/2012/main" showMasterPhAnim="0" showMasterSp="0">
+  <p:cSld>
+    <p:spTree>
+      <p:nvGrpSpPr>
+        <p:cNvPr id="108" name="Shape 108"/>
+        <p:cNvGrpSpPr/>
+        <p:nvPr/>
+      </p:nvGrpSpPr>
+      <p:grpSpPr>
+        <a:xfrm>
+          <a:off x="0" y="0"/>
+          <a:ext cx="0" cy="0"/>
+          <a:chOff x="0" y="0"/>
+          <a:chExt cx="0" cy="0"/>
+        </a:xfrm>
+      </p:grpSpPr>
+      <p:sp>
+        <p:nvSpPr>
+          <p:cNvPr id="109" name="Google Shape;109;g8bc219c924_1_113:notes"/>
+          <p:cNvSpPr/>
+          <p:nvPr>
+            <p:ph idx="2" type="sldImg"/>
+          </p:nvPr>
+        </p:nvSpPr>
+        <p:spPr>
+          <a:xfrm>
+            <a:off x="381300" y="685800"/>
+            <a:ext cx="6096000" cy="3429000"/>
+          </a:xfrm>
+          <a:custGeom>
+            <a:rect b="b" l="l" r="r" t="t"/>
+            <a:pathLst>
+              <a:path extrusionOk="0" h="120000" w="120000">
+                <a:moveTo>
+                  <a:pt x="0" y="0"/>
+                </a:moveTo>
+                <a:lnTo>
+                  <a:pt x="120000" y="0"/>
+                </a:lnTo>
+                <a:lnTo>
+                  <a:pt x="120000" y="120000"/>
+                </a:lnTo>
+                <a:lnTo>
+                  <a:pt x="0" y="120000"/>
+                </a:lnTo>
+                <a:close/>
+              </a:path>
+            </a:pathLst>
+          </a:custGeom>
+          <a:noFill/>
+          <a:ln cap="flat" cmpd="sng" w="9525">
+            <a:solidFill>
+              <a:srgbClr val="000000"/>
+            </a:solidFill>
+            <a:prstDash val="solid"/>
+            <a:round/>
+            <a:headEnd len="sm" w="sm" type="none"/>
+            <a:tailEnd len="sm" w="sm" type="none"/>
+          </a:ln>
+        </p:spPr>
+      </p:sp>
+      <p:sp>
+        <p:nvSpPr>
+          <p:cNvPr id="110" name="Google Shape;110;g8bc219c924_1_113:notes"/>
+          <p:cNvSpPr txBox="1"/>
+          <p:nvPr>
+            <p:ph idx="1" type="body"/>
+          </p:nvPr>
+        </p:nvSpPr>
+        <p:spPr>
+          <a:xfrm>
+            <a:off x="685800" y="4343400"/>
+            <a:ext cx="5486400" cy="4114800"/>
+          </a:xfrm>
+          <a:prstGeom prst="rect">
+            <a:avLst/>
+          </a:prstGeom>
+          <a:noFill/>
+          <a:ln>
+            <a:noFill/>
+          </a:ln>
+        </p:spPr>
+        <p:txBody>
+          <a:bodyPr anchorCtr="0" anchor="t" bIns="91425" lIns="91425" spcFirstLastPara="1" rIns="91425" wrap="square" tIns="91425">
+            <a:noAutofit/>
+          </a:bodyPr>
+          <a:lstStyle/>
+          <a:p>
+            <a:pPr indent="0" lvl="0" marL="0" rtl="0" algn="l">
+              <a:lnSpc>
+                <a:spcPct val="100000"/>
+              </a:lnSpc>
+              <a:spcBef>
+                <a:spcPts val="0"/>
+              </a:spcBef>
+              <a:spcAft>
+                <a:spcPts val="0"/>
+              </a:spcAft>
+              <a:buSzPts val="1100"/>
+              <a:buNone/>
+            </a:pPr>
+            <a:r>
+              <a:t/>
+            </a:r>
+            <a:endParaRPr/>
+          </a:p>
+        </p:txBody>
+      </p:sp>
+    </p:spTree>
+  </p:cSld>
+  <p:clrMapOvr>
+    <a:masterClrMapping/>
+  </p:clrMapOvr>
+</p:notes>
+</file>
+
+<file path=ppt/notesSlides/notesSlide6.xml><?xml version="1.0" encoding="utf-8"?>
+<p:notes xmlns:a="http://schemas.openxmlformats.org/drawingml/2006/main" xmlns:r="http://schemas.openxmlformats.org/officeDocument/2006/relationships" xmlns:mc="http://schemas.openxmlformats.org/markup-compatibility/2006" xmlns:mv="urn:schemas-microsoft-com:mac:vml" xmlns:p="http://schemas.openxmlformats.org/presentationml/2006/main" xmlns:c="http://schemas.openxmlformats.org/drawingml/2006/chart" xmlns:dgm="http://schemas.openxmlformats.org/drawingml/2006/diagram" xmlns:o="urn:schemas-microsoft-com:office:office" xmlns:v="urn:schemas-microsoft-com:vml" xmlns:pvml="urn:schemas-microsoft-com:office:powerpoint" xmlns:com="http://schemas.openxmlformats.org/drawingml/2006/compatibility" xmlns:p14="http://schemas.microsoft.com/office/powerpoint/2010/main" xmlns:p15="http://schemas.microsoft.com/office/powerpoint/2012/main" showMasterPhAnim="0" showMasterSp="0">
+  <p:cSld>
+    <p:spTree>
+      <p:nvGrpSpPr>
+        <p:cNvPr id="122" name="Shape 122"/>
+        <p:cNvGrpSpPr/>
+        <p:nvPr/>
+      </p:nvGrpSpPr>
+      <p:grpSpPr>
+        <a:xfrm>
+          <a:off x="0" y="0"/>
+          <a:ext cx="0" cy="0"/>
+          <a:chOff x="0" y="0"/>
+          <a:chExt cx="0" cy="0"/>
+        </a:xfrm>
+      </p:grpSpPr>
+      <p:sp>
+        <p:nvSpPr>
+          <p:cNvPr id="123" name="Google Shape;123;g8bc219c924_1_130:notes"/>
+          <p:cNvSpPr/>
+          <p:nvPr>
+            <p:ph idx="2" type="sldImg"/>
+          </p:nvPr>
+        </p:nvSpPr>
+        <p:spPr>
+          <a:xfrm>
+            <a:off x="381300" y="685800"/>
+            <a:ext cx="6096000" cy="3429000"/>
+          </a:xfrm>
+          <a:custGeom>
+            <a:rect b="b" l="l" r="r" t="t"/>
+            <a:pathLst>
+              <a:path extrusionOk="0" h="120000" w="120000">
+                <a:moveTo>
+                  <a:pt x="0" y="0"/>
+                </a:moveTo>
+                <a:lnTo>
+                  <a:pt x="120000" y="0"/>
+                </a:lnTo>
+                <a:lnTo>
+                  <a:pt x="120000" y="120000"/>
+                </a:lnTo>
+                <a:lnTo>
+                  <a:pt x="0" y="120000"/>
+                </a:lnTo>
+                <a:close/>
+              </a:path>
+            </a:pathLst>
+          </a:custGeom>
+          <a:noFill/>
+          <a:ln cap="flat" cmpd="sng" w="9525">
+            <a:solidFill>
+              <a:srgbClr val="000000"/>
+            </a:solidFill>
+            <a:prstDash val="solid"/>
+            <a:round/>
+            <a:headEnd len="sm" w="sm" type="none"/>
+            <a:tailEnd len="sm" w="sm" type="none"/>
+          </a:ln>
+        </p:spPr>
+      </p:sp>
+      <p:sp>
+        <p:nvSpPr>
+          <p:cNvPr id="124" name="Google Shape;124;g8bc219c924_1_130:notes"/>
           <p:cNvSpPr txBox="1"/>
           <p:nvPr>
             <p:ph idx="1" type="body"/>
@@ -10588,6 +11060,3847 @@
 </p:sld>
 </file>
 
+<file path=ppt/slides/slide3.xml><?xml version="1.0" encoding="utf-8"?>
+<p:sld xmlns:a="http://schemas.openxmlformats.org/drawingml/2006/main" xmlns:r="http://schemas.openxmlformats.org/officeDocument/2006/relationships" xmlns:mc="http://schemas.openxmlformats.org/markup-compatibility/2006" xmlns:mv="urn:schemas-microsoft-com:mac:vml" xmlns:p="http://schemas.openxmlformats.org/presentationml/2006/main" xmlns:c="http://schemas.openxmlformats.org/drawingml/2006/chart" xmlns:dgm="http://schemas.openxmlformats.org/drawingml/2006/diagram" xmlns:o="urn:schemas-microsoft-com:office:office" xmlns:v="urn:schemas-microsoft-com:vml" xmlns:pvml="urn:schemas-microsoft-com:office:powerpoint" xmlns:com="http://schemas.openxmlformats.org/drawingml/2006/compatibility" xmlns:p14="http://schemas.microsoft.com/office/powerpoint/2010/main" xmlns:p15="http://schemas.microsoft.com/office/powerpoint/2012/main">
+  <p:cSld>
+    <p:spTree>
+      <p:nvGrpSpPr>
+        <p:cNvPr id="81" name="Shape 81"/>
+        <p:cNvGrpSpPr/>
+        <p:nvPr/>
+      </p:nvGrpSpPr>
+      <p:grpSpPr>
+        <a:xfrm>
+          <a:off x="0" y="0"/>
+          <a:ext cx="0" cy="0"/>
+          <a:chOff x="0" y="0"/>
+          <a:chExt cx="0" cy="0"/>
+        </a:xfrm>
+      </p:grpSpPr>
+      <p:sp>
+        <p:nvSpPr>
+          <p:cNvPr id="82" name="Google Shape;82;p15"/>
+          <p:cNvSpPr/>
+          <p:nvPr/>
+        </p:nvSpPr>
+        <p:spPr>
+          <a:xfrm>
+            <a:off x="-179682" y="-308191"/>
+            <a:ext cx="9647400" cy="1688700"/>
+          </a:xfrm>
+          <a:prstGeom prst="rect">
+            <a:avLst/>
+          </a:prstGeom>
+          <a:solidFill>
+            <a:srgbClr val="002645"/>
+          </a:solidFill>
+          <a:ln>
+            <a:noFill/>
+          </a:ln>
+          <a:effectLst>
+            <a:outerShdw blurRad="50800" rotWithShape="0" dir="5400000" dist="38100">
+              <a:srgbClr val="000000">
+                <a:alpha val="40000"/>
+              </a:srgbClr>
+            </a:outerShdw>
+          </a:effectLst>
+        </p:spPr>
+        <p:txBody>
+          <a:bodyPr anchorCtr="0" anchor="ctr" bIns="34275" lIns="34275" spcFirstLastPara="1" rIns="34275" wrap="square" tIns="34275">
+            <a:noAutofit/>
+          </a:bodyPr>
+          <a:lstStyle/>
+          <a:p>
+            <a:pPr indent="0" lvl="0" marL="0" marR="0" rtl="0" algn="ctr">
+              <a:lnSpc>
+                <a:spcPct val="100000"/>
+              </a:lnSpc>
+              <a:spcBef>
+                <a:spcPts val="0"/>
+              </a:spcBef>
+              <a:spcAft>
+                <a:spcPts val="0"/>
+              </a:spcAft>
+              <a:buClr>
+                <a:srgbClr val="FFFFFF"/>
+              </a:buClr>
+              <a:buSzPts val="1400"/>
+              <a:buFont typeface="Calibri"/>
+              <a:buNone/>
+            </a:pPr>
+            <a:r>
+              <a:t/>
+            </a:r>
+            <a:endParaRPr b="0" i="0" sz="1400" u="none" cap="none" strike="noStrike">
+              <a:solidFill>
+                <a:srgbClr val="FFFFFF"/>
+              </a:solidFill>
+              <a:latin typeface="Calibri"/>
+              <a:ea typeface="Calibri"/>
+              <a:cs typeface="Calibri"/>
+              <a:sym typeface="Calibri"/>
+            </a:endParaRPr>
+          </a:p>
+        </p:txBody>
+      </p:sp>
+      <p:sp>
+        <p:nvSpPr>
+          <p:cNvPr id="83" name="Google Shape;83;p15"/>
+          <p:cNvSpPr/>
+          <p:nvPr/>
+        </p:nvSpPr>
+        <p:spPr>
+          <a:xfrm>
+            <a:off x="228600" y="331700"/>
+            <a:ext cx="8915400" cy="468600"/>
+          </a:xfrm>
+          <a:prstGeom prst="rect">
+            <a:avLst/>
+          </a:prstGeom>
+          <a:noFill/>
+          <a:ln>
+            <a:noFill/>
+          </a:ln>
+        </p:spPr>
+        <p:txBody>
+          <a:bodyPr anchorCtr="0" anchor="t" bIns="34275" lIns="34275" spcFirstLastPara="1" rIns="34275" wrap="square" tIns="34275">
+            <a:noAutofit/>
+          </a:bodyPr>
+          <a:lstStyle/>
+          <a:p>
+            <a:pPr indent="0" lvl="0" marL="0" marR="0" rtl="0" algn="l">
+              <a:lnSpc>
+                <a:spcPct val="100000"/>
+              </a:lnSpc>
+              <a:spcBef>
+                <a:spcPts val="0"/>
+              </a:spcBef>
+              <a:spcAft>
+                <a:spcPts val="0"/>
+              </a:spcAft>
+              <a:buClr>
+                <a:srgbClr val="F2F2F2"/>
+              </a:buClr>
+              <a:buSzPts val="2600"/>
+              <a:buFont typeface="Open Sans"/>
+              <a:buNone/>
+            </a:pPr>
+            <a:r>
+              <a:rPr b="1" i="0" lang="en" sz="2600" u="none" cap="none" strike="noStrike">
+                <a:solidFill>
+                  <a:srgbClr val="F2F2F2"/>
+                </a:solidFill>
+                <a:latin typeface="Open Sans"/>
+                <a:ea typeface="Open Sans"/>
+                <a:cs typeface="Open Sans"/>
+                <a:sym typeface="Open Sans"/>
+              </a:rPr>
+              <a:t>AWS </a:t>
+            </a:r>
+            <a:r>
+              <a:rPr b="1" lang="en" sz="2600">
+                <a:solidFill>
+                  <a:srgbClr val="F2F2F2"/>
+                </a:solidFill>
+                <a:latin typeface="Open Sans"/>
+                <a:ea typeface="Open Sans"/>
+                <a:cs typeface="Open Sans"/>
+                <a:sym typeface="Open Sans"/>
+              </a:rPr>
+              <a:t>Data Analytics</a:t>
+            </a:r>
+            <a:r>
+              <a:rPr b="1" i="0" lang="en" sz="2600" u="none" cap="none" strike="noStrike">
+                <a:solidFill>
+                  <a:srgbClr val="F2F2F2"/>
+                </a:solidFill>
+                <a:latin typeface="Open Sans"/>
+                <a:ea typeface="Open Sans"/>
+                <a:cs typeface="Open Sans"/>
+                <a:sym typeface="Open Sans"/>
+              </a:rPr>
+              <a:t> - </a:t>
+            </a:r>
+            <a:r>
+              <a:rPr b="1" lang="en" sz="2100">
+                <a:solidFill>
+                  <a:srgbClr val="F2F2F2"/>
+                </a:solidFill>
+                <a:latin typeface="Open Sans"/>
+                <a:ea typeface="Open Sans"/>
+                <a:cs typeface="Open Sans"/>
+                <a:sym typeface="Open Sans"/>
+              </a:rPr>
+              <a:t>Introduction to Data Collection Systems</a:t>
+            </a:r>
+            <a:r>
+              <a:rPr b="1" i="0" lang="en" sz="2600" u="none" cap="none" strike="noStrike">
+                <a:solidFill>
+                  <a:srgbClr val="F2F2F2"/>
+                </a:solidFill>
+                <a:latin typeface="Open Sans"/>
+                <a:ea typeface="Open Sans"/>
+                <a:cs typeface="Open Sans"/>
+                <a:sym typeface="Open Sans"/>
+              </a:rPr>
+              <a:t> </a:t>
+            </a:r>
+            <a:endParaRPr b="0" i="0" sz="1100" u="none" cap="none" strike="noStrike">
+              <a:solidFill>
+                <a:srgbClr val="000000"/>
+              </a:solidFill>
+              <a:latin typeface="Arial"/>
+              <a:ea typeface="Arial"/>
+              <a:cs typeface="Arial"/>
+              <a:sym typeface="Arial"/>
+            </a:endParaRPr>
+          </a:p>
+        </p:txBody>
+      </p:sp>
+      <p:sp>
+        <p:nvSpPr>
+          <p:cNvPr id="84" name="Google Shape;84;p15"/>
+          <p:cNvSpPr/>
+          <p:nvPr/>
+        </p:nvSpPr>
+        <p:spPr>
+          <a:xfrm>
+            <a:off x="313771" y="843754"/>
+            <a:ext cx="2789700" cy="34200"/>
+          </a:xfrm>
+          <a:prstGeom prst="rect">
+            <a:avLst/>
+          </a:prstGeom>
+          <a:solidFill>
+            <a:srgbClr val="DE6E22"/>
+          </a:solidFill>
+          <a:ln>
+            <a:noFill/>
+          </a:ln>
+        </p:spPr>
+        <p:txBody>
+          <a:bodyPr anchorCtr="0" anchor="ctr" bIns="34275" lIns="34275" spcFirstLastPara="1" rIns="34275" wrap="square" tIns="34275">
+            <a:noAutofit/>
+          </a:bodyPr>
+          <a:lstStyle/>
+          <a:p>
+            <a:pPr indent="0" lvl="0" marL="0" marR="0" rtl="0" algn="ctr">
+              <a:lnSpc>
+                <a:spcPct val="100000"/>
+              </a:lnSpc>
+              <a:spcBef>
+                <a:spcPts val="0"/>
+              </a:spcBef>
+              <a:spcAft>
+                <a:spcPts val="0"/>
+              </a:spcAft>
+              <a:buClr>
+                <a:srgbClr val="FFFFFF"/>
+              </a:buClr>
+              <a:buSzPts val="1400"/>
+              <a:buFont typeface="Calibri"/>
+              <a:buNone/>
+            </a:pPr>
+            <a:r>
+              <a:t/>
+            </a:r>
+            <a:endParaRPr b="0" i="0" sz="1400" u="none" cap="none" strike="noStrike">
+              <a:solidFill>
+                <a:srgbClr val="FFFFFF"/>
+              </a:solidFill>
+              <a:latin typeface="Calibri"/>
+              <a:ea typeface="Calibri"/>
+              <a:cs typeface="Calibri"/>
+              <a:sym typeface="Calibri"/>
+            </a:endParaRPr>
+          </a:p>
+        </p:txBody>
+      </p:sp>
+      <p:sp>
+        <p:nvSpPr>
+          <p:cNvPr id="85" name="Google Shape;85;p15"/>
+          <p:cNvSpPr/>
+          <p:nvPr/>
+        </p:nvSpPr>
+        <p:spPr>
+          <a:xfrm>
+            <a:off x="228600" y="952975"/>
+            <a:ext cx="8724600" cy="335100"/>
+          </a:xfrm>
+          <a:prstGeom prst="rect">
+            <a:avLst/>
+          </a:prstGeom>
+          <a:noFill/>
+          <a:ln>
+            <a:noFill/>
+          </a:ln>
+        </p:spPr>
+        <p:txBody>
+          <a:bodyPr anchorCtr="0" anchor="t" bIns="34275" lIns="34275" spcFirstLastPara="1" rIns="34275" wrap="square" tIns="34275">
+            <a:noAutofit/>
+          </a:bodyPr>
+          <a:lstStyle/>
+          <a:p>
+            <a:pPr indent="0" lvl="0" marL="0" marR="0" rtl="0" algn="l">
+              <a:lnSpc>
+                <a:spcPct val="100000"/>
+              </a:lnSpc>
+              <a:spcBef>
+                <a:spcPts val="0"/>
+              </a:spcBef>
+              <a:spcAft>
+                <a:spcPts val="0"/>
+              </a:spcAft>
+              <a:buClr>
+                <a:srgbClr val="D9D9D9"/>
+              </a:buClr>
+              <a:buSzPts val="1700"/>
+              <a:buFont typeface="Open Sans"/>
+              <a:buNone/>
+            </a:pPr>
+            <a:r>
+              <a:rPr b="0" i="0" lang="en" sz="1700" u="none" cap="none" strike="noStrike">
+                <a:solidFill>
+                  <a:srgbClr val="D9D9D9"/>
+                </a:solidFill>
+                <a:latin typeface="Open Sans"/>
+                <a:ea typeface="Open Sans"/>
+                <a:cs typeface="Open Sans"/>
+                <a:sym typeface="Open Sans"/>
+              </a:rPr>
+              <a:t>Introduction -</a:t>
+            </a:r>
+            <a:r>
+              <a:rPr lang="en" sz="1700">
+                <a:solidFill>
+                  <a:srgbClr val="D9D9D9"/>
+                </a:solidFill>
+                <a:latin typeface="Open Sans"/>
+                <a:ea typeface="Open Sans"/>
+                <a:cs typeface="Open Sans"/>
+                <a:sym typeface="Open Sans"/>
+              </a:rPr>
+              <a:t> Determine the operational characteristics of the collection system</a:t>
+            </a:r>
+            <a:endParaRPr b="0" i="0" sz="1100" u="none" cap="none" strike="noStrike">
+              <a:solidFill>
+                <a:srgbClr val="000000"/>
+              </a:solidFill>
+              <a:latin typeface="Arial"/>
+              <a:ea typeface="Arial"/>
+              <a:cs typeface="Arial"/>
+              <a:sym typeface="Arial"/>
+            </a:endParaRPr>
+          </a:p>
+        </p:txBody>
+      </p:sp>
+      <p:pic>
+        <p:nvPicPr>
+          <p:cNvPr id="86" name="Google Shape;86;p15"/>
+          <p:cNvPicPr preferRelativeResize="0"/>
+          <p:nvPr/>
+        </p:nvPicPr>
+        <p:blipFill rotWithShape="1">
+          <a:blip r:embed="rId3">
+            <a:alphaModFix/>
+          </a:blip>
+          <a:srcRect b="0" l="0" r="0" t="0"/>
+          <a:stretch/>
+        </p:blipFill>
+        <p:spPr>
+          <a:xfrm>
+            <a:off x="8325525" y="4593059"/>
+            <a:ext cx="752475" cy="495300"/>
+          </a:xfrm>
+          <a:prstGeom prst="rect">
+            <a:avLst/>
+          </a:prstGeom>
+          <a:noFill/>
+          <a:ln>
+            <a:noFill/>
+          </a:ln>
+        </p:spPr>
+      </p:pic>
+      <p:sp>
+        <p:nvSpPr>
+          <p:cNvPr id="87" name="Google Shape;87;p15"/>
+          <p:cNvSpPr txBox="1"/>
+          <p:nvPr/>
+        </p:nvSpPr>
+        <p:spPr>
+          <a:xfrm>
+            <a:off x="708850" y="1584675"/>
+            <a:ext cx="6743100" cy="335100"/>
+          </a:xfrm>
+          <a:prstGeom prst="rect">
+            <a:avLst/>
+          </a:prstGeom>
+          <a:noFill/>
+          <a:ln>
+            <a:noFill/>
+          </a:ln>
+        </p:spPr>
+        <p:txBody>
+          <a:bodyPr anchorCtr="0" anchor="t" bIns="91425" lIns="91425" spcFirstLastPara="1" rIns="91425" wrap="square" tIns="91425">
+            <a:noAutofit/>
+          </a:bodyPr>
+          <a:lstStyle/>
+          <a:p>
+            <a:pPr indent="-317500" lvl="0" marL="457200" marR="0" rtl="0" algn="l">
+              <a:lnSpc>
+                <a:spcPct val="100000"/>
+              </a:lnSpc>
+              <a:spcBef>
+                <a:spcPts val="0"/>
+              </a:spcBef>
+              <a:spcAft>
+                <a:spcPts val="0"/>
+              </a:spcAft>
+              <a:buClr>
+                <a:srgbClr val="000000"/>
+              </a:buClr>
+              <a:buSzPts val="1400"/>
+              <a:buFont typeface="Arial"/>
+              <a:buChar char="❏"/>
+            </a:pPr>
+            <a:r>
+              <a:rPr lang="en"/>
+              <a:t>Determine the operational characteristics of the collection system</a:t>
+            </a:r>
+            <a:endParaRPr b="0" i="0" sz="1400" u="none" cap="none" strike="noStrike">
+              <a:solidFill>
+                <a:srgbClr val="000000"/>
+              </a:solidFill>
+              <a:latin typeface="Arial"/>
+              <a:ea typeface="Arial"/>
+              <a:cs typeface="Arial"/>
+              <a:sym typeface="Arial"/>
+            </a:endParaRPr>
+          </a:p>
+        </p:txBody>
+      </p:sp>
+      <p:sp>
+        <p:nvSpPr>
+          <p:cNvPr id="88" name="Google Shape;88;p15"/>
+          <p:cNvSpPr txBox="1"/>
+          <p:nvPr/>
+        </p:nvSpPr>
+        <p:spPr>
+          <a:xfrm>
+            <a:off x="1013650" y="1965675"/>
+            <a:ext cx="6743100" cy="335100"/>
+          </a:xfrm>
+          <a:prstGeom prst="rect">
+            <a:avLst/>
+          </a:prstGeom>
+          <a:noFill/>
+          <a:ln>
+            <a:noFill/>
+          </a:ln>
+        </p:spPr>
+        <p:txBody>
+          <a:bodyPr anchorCtr="0" anchor="t" bIns="91425" lIns="91425" spcFirstLastPara="1" rIns="91425" wrap="square" tIns="91425">
+            <a:noAutofit/>
+          </a:bodyPr>
+          <a:lstStyle/>
+          <a:p>
+            <a:pPr indent="-317500" lvl="0" marL="457200" marR="0" rtl="0" algn="l">
+              <a:lnSpc>
+                <a:spcPct val="100000"/>
+              </a:lnSpc>
+              <a:spcBef>
+                <a:spcPts val="0"/>
+              </a:spcBef>
+              <a:spcAft>
+                <a:spcPts val="0"/>
+              </a:spcAft>
+              <a:buClr>
+                <a:srgbClr val="000000"/>
+              </a:buClr>
+              <a:buSzPts val="1400"/>
+              <a:buFont typeface="Arial"/>
+              <a:buChar char="❏"/>
+            </a:pPr>
+            <a:r>
+              <a:rPr lang="en"/>
+              <a:t>Streaming operational components</a:t>
+            </a:r>
+            <a:endParaRPr b="0" i="0" sz="1400" u="none" cap="none" strike="noStrike">
+              <a:solidFill>
+                <a:srgbClr val="000000"/>
+              </a:solidFill>
+              <a:latin typeface="Arial"/>
+              <a:ea typeface="Arial"/>
+              <a:cs typeface="Arial"/>
+              <a:sym typeface="Arial"/>
+            </a:endParaRPr>
+          </a:p>
+        </p:txBody>
+      </p:sp>
+      <p:sp>
+        <p:nvSpPr>
+          <p:cNvPr id="89" name="Google Shape;89;p15"/>
+          <p:cNvSpPr txBox="1"/>
+          <p:nvPr/>
+        </p:nvSpPr>
+        <p:spPr>
+          <a:xfrm>
+            <a:off x="1013650" y="3190750"/>
+            <a:ext cx="6743100" cy="335100"/>
+          </a:xfrm>
+          <a:prstGeom prst="rect">
+            <a:avLst/>
+          </a:prstGeom>
+          <a:noFill/>
+          <a:ln>
+            <a:noFill/>
+          </a:ln>
+        </p:spPr>
+        <p:txBody>
+          <a:bodyPr anchorCtr="0" anchor="t" bIns="91425" lIns="91425" spcFirstLastPara="1" rIns="91425" wrap="square" tIns="91425">
+            <a:noAutofit/>
+          </a:bodyPr>
+          <a:lstStyle/>
+          <a:p>
+            <a:pPr indent="-317500" lvl="0" marL="457200" marR="0" rtl="0" algn="l">
+              <a:lnSpc>
+                <a:spcPct val="100000"/>
+              </a:lnSpc>
+              <a:spcBef>
+                <a:spcPts val="0"/>
+              </a:spcBef>
+              <a:spcAft>
+                <a:spcPts val="0"/>
+              </a:spcAft>
+              <a:buClr>
+                <a:srgbClr val="000000"/>
+              </a:buClr>
+              <a:buSzPts val="1400"/>
+              <a:buFont typeface="Arial"/>
+              <a:buChar char="❏"/>
+            </a:pPr>
+            <a:r>
+              <a:rPr lang="en"/>
+              <a:t>Fault tolerance and data persistence</a:t>
+            </a:r>
+            <a:endParaRPr b="0" i="0" sz="1400" u="none" cap="none" strike="noStrike">
+              <a:solidFill>
+                <a:srgbClr val="000000"/>
+              </a:solidFill>
+              <a:latin typeface="Arial"/>
+              <a:ea typeface="Arial"/>
+              <a:cs typeface="Arial"/>
+              <a:sym typeface="Arial"/>
+            </a:endParaRPr>
+          </a:p>
+        </p:txBody>
+      </p:sp>
+      <p:pic>
+        <p:nvPicPr>
+          <p:cNvPr id="90" name="Google Shape;90;p15">
+            <a:hlinkClick r:id="rId4"/>
+          </p:cNvPr>
+          <p:cNvPicPr preferRelativeResize="0"/>
+          <p:nvPr/>
+        </p:nvPicPr>
+        <p:blipFill>
+          <a:blip r:embed="rId5">
+            <a:alphaModFix/>
+          </a:blip>
+          <a:stretch>
+            <a:fillRect/>
+          </a:stretch>
+        </p:blipFill>
+        <p:spPr>
+          <a:xfrm>
+            <a:off x="4699267" y="1508487"/>
+            <a:ext cx="4173087" cy="2317753"/>
+          </a:xfrm>
+          <a:prstGeom prst="rect">
+            <a:avLst/>
+          </a:prstGeom>
+          <a:noFill/>
+          <a:ln>
+            <a:noFill/>
+          </a:ln>
+        </p:spPr>
+      </p:pic>
+      <p:pic>
+        <p:nvPicPr>
+          <p:cNvPr id="91" name="Google Shape;91;p15">
+            <a:hlinkClick r:id="rId6"/>
+          </p:cNvPr>
+          <p:cNvPicPr preferRelativeResize="0"/>
+          <p:nvPr/>
+        </p:nvPicPr>
+        <p:blipFill>
+          <a:blip r:embed="rId7">
+            <a:alphaModFix/>
+          </a:blip>
+          <a:stretch>
+            <a:fillRect/>
+          </a:stretch>
+        </p:blipFill>
+        <p:spPr>
+          <a:xfrm>
+            <a:off x="1456825" y="3701224"/>
+            <a:ext cx="5007502" cy="990125"/>
+          </a:xfrm>
+          <a:prstGeom prst="rect">
+            <a:avLst/>
+          </a:prstGeom>
+          <a:noFill/>
+          <a:ln>
+            <a:noFill/>
+          </a:ln>
+        </p:spPr>
+      </p:pic>
+    </p:spTree>
+  </p:cSld>
+  <p:clrMapOvr>
+    <a:masterClrMapping/>
+  </p:clrMapOvr>
+  <p:timing>
+    <p:tnLst>
+      <p:par>
+        <p:cTn dur="indefinite" nodeType="tmRoot" restart="never">
+          <p:childTnLst>
+            <p:seq concurrent="1" nextAc="seek">
+              <p:cTn dur="indefinite" id="2" nodeType="mainSeq">
+                <p:childTnLst>
+                  <p:par>
+                    <p:cTn fill="hold">
+                      <p:stCondLst>
+                        <p:cond delay="indefinite"/>
+                      </p:stCondLst>
+                      <p:childTnLst>
+                        <p:par>
+                          <p:cTn fill="hold">
+                            <p:stCondLst>
+                              <p:cond delay="0"/>
+                            </p:stCondLst>
+                            <p:childTnLst>
+                              <p:par>
+                                <p:cTn fill="hold" nodeType="clickEffect" presetClass="entr" presetID="10" presetSubtype="0">
+                                  <p:stCondLst>
+                                    <p:cond delay="0"/>
+                                  </p:stCondLst>
+                                  <p:childTnLst>
+                                    <p:set>
+                                      <p:cBhvr>
+                                        <p:cTn dur="1" fill="hold">
+                                          <p:stCondLst>
+                                            <p:cond delay="0"/>
+                                          </p:stCondLst>
+                                        </p:cTn>
+                                        <p:tgtEl>
+                                          <p:spTgt spid="87"/>
+                                        </p:tgtEl>
+                                        <p:attrNameLst>
+                                          <p:attrName>style.visibility</p:attrName>
+                                        </p:attrNameLst>
+                                      </p:cBhvr>
+                                      <p:to>
+                                        <p:strVal val="visible"/>
+                                      </p:to>
+                                    </p:set>
+                                    <p:animEffect filter="fade" transition="in">
+                                      <p:cBhvr>
+                                        <p:cTn dur="1000"/>
+                                        <p:tgtEl>
+                                          <p:spTgt spid="87"/>
+                                        </p:tgtEl>
+                                      </p:cBhvr>
+                                    </p:animEffect>
+                                  </p:childTnLst>
+                                </p:cTn>
+                              </p:par>
+                            </p:childTnLst>
+                          </p:cTn>
+                        </p:par>
+                      </p:childTnLst>
+                    </p:cTn>
+                  </p:par>
+                  <p:par>
+                    <p:cTn fill="hold">
+                      <p:stCondLst>
+                        <p:cond delay="indefinite"/>
+                      </p:stCondLst>
+                      <p:childTnLst>
+                        <p:par>
+                          <p:cTn fill="hold">
+                            <p:stCondLst>
+                              <p:cond delay="0"/>
+                            </p:stCondLst>
+                            <p:childTnLst>
+                              <p:par>
+                                <p:cTn fill="hold" nodeType="clickEffect" presetClass="entr" presetID="10" presetSubtype="0">
+                                  <p:stCondLst>
+                                    <p:cond delay="0"/>
+                                  </p:stCondLst>
+                                  <p:childTnLst>
+                                    <p:set>
+                                      <p:cBhvr>
+                                        <p:cTn dur="1" fill="hold">
+                                          <p:stCondLst>
+                                            <p:cond delay="0"/>
+                                          </p:stCondLst>
+                                        </p:cTn>
+                                        <p:tgtEl>
+                                          <p:spTgt spid="88"/>
+                                        </p:tgtEl>
+                                        <p:attrNameLst>
+                                          <p:attrName>style.visibility</p:attrName>
+                                        </p:attrNameLst>
+                                      </p:cBhvr>
+                                      <p:to>
+                                        <p:strVal val="visible"/>
+                                      </p:to>
+                                    </p:set>
+                                    <p:animEffect filter="fade" transition="in">
+                                      <p:cBhvr>
+                                        <p:cTn dur="1000"/>
+                                        <p:tgtEl>
+                                          <p:spTgt spid="88"/>
+                                        </p:tgtEl>
+                                      </p:cBhvr>
+                                    </p:animEffect>
+                                  </p:childTnLst>
+                                </p:cTn>
+                              </p:par>
+                              <p:par>
+                                <p:cTn fill="hold" nodeType="withEffect" presetClass="entr" presetID="10" presetSubtype="0">
+                                  <p:stCondLst>
+                                    <p:cond delay="0"/>
+                                  </p:stCondLst>
+                                  <p:childTnLst>
+                                    <p:set>
+                                      <p:cBhvr>
+                                        <p:cTn dur="1" fill="hold">
+                                          <p:stCondLst>
+                                            <p:cond delay="0"/>
+                                          </p:stCondLst>
+                                        </p:cTn>
+                                        <p:tgtEl>
+                                          <p:spTgt spid="90"/>
+                                        </p:tgtEl>
+                                        <p:attrNameLst>
+                                          <p:attrName>style.visibility</p:attrName>
+                                        </p:attrNameLst>
+                                      </p:cBhvr>
+                                      <p:to>
+                                        <p:strVal val="visible"/>
+                                      </p:to>
+                                    </p:set>
+                                    <p:animEffect filter="fade" transition="in">
+                                      <p:cBhvr>
+                                        <p:cTn dur="1000"/>
+                                        <p:tgtEl>
+                                          <p:spTgt spid="90"/>
+                                        </p:tgtEl>
+                                      </p:cBhvr>
+                                    </p:animEffect>
+                                  </p:childTnLst>
+                                </p:cTn>
+                              </p:par>
+                            </p:childTnLst>
+                          </p:cTn>
+                        </p:par>
+                      </p:childTnLst>
+                    </p:cTn>
+                  </p:par>
+                  <p:par>
+                    <p:cTn fill="hold">
+                      <p:stCondLst>
+                        <p:cond delay="indefinite"/>
+                      </p:stCondLst>
+                      <p:childTnLst>
+                        <p:par>
+                          <p:cTn fill="hold">
+                            <p:stCondLst>
+                              <p:cond delay="0"/>
+                            </p:stCondLst>
+                            <p:childTnLst>
+                              <p:par>
+                                <p:cTn fill="hold" nodeType="clickEffect" presetClass="entr" presetID="10" presetSubtype="0">
+                                  <p:stCondLst>
+                                    <p:cond delay="0"/>
+                                  </p:stCondLst>
+                                  <p:childTnLst>
+                                    <p:set>
+                                      <p:cBhvr>
+                                        <p:cTn dur="1" fill="hold">
+                                          <p:stCondLst>
+                                            <p:cond delay="0"/>
+                                          </p:stCondLst>
+                                        </p:cTn>
+                                        <p:tgtEl>
+                                          <p:spTgt spid="89"/>
+                                        </p:tgtEl>
+                                        <p:attrNameLst>
+                                          <p:attrName>style.visibility</p:attrName>
+                                        </p:attrNameLst>
+                                      </p:cBhvr>
+                                      <p:to>
+                                        <p:strVal val="visible"/>
+                                      </p:to>
+                                    </p:set>
+                                    <p:animEffect filter="fade" transition="in">
+                                      <p:cBhvr>
+                                        <p:cTn dur="1000"/>
+                                        <p:tgtEl>
+                                          <p:spTgt spid="89"/>
+                                        </p:tgtEl>
+                                      </p:cBhvr>
+                                    </p:animEffect>
+                                  </p:childTnLst>
+                                </p:cTn>
+                              </p:par>
+                              <p:par>
+                                <p:cTn fill="hold" nodeType="withEffect" presetClass="entr" presetID="10" presetSubtype="0">
+                                  <p:stCondLst>
+                                    <p:cond delay="0"/>
+                                  </p:stCondLst>
+                                  <p:childTnLst>
+                                    <p:set>
+                                      <p:cBhvr>
+                                        <p:cTn dur="1" fill="hold">
+                                          <p:stCondLst>
+                                            <p:cond delay="0"/>
+                                          </p:stCondLst>
+                                        </p:cTn>
+                                        <p:tgtEl>
+                                          <p:spTgt spid="91"/>
+                                        </p:tgtEl>
+                                        <p:attrNameLst>
+                                          <p:attrName>style.visibility</p:attrName>
+                                        </p:attrNameLst>
+                                      </p:cBhvr>
+                                      <p:to>
+                                        <p:strVal val="visible"/>
+                                      </p:to>
+                                    </p:set>
+                                    <p:animEffect filter="fade" transition="in">
+                                      <p:cBhvr>
+                                        <p:cTn dur="1000"/>
+                                        <p:tgtEl>
+                                          <p:spTgt spid="91"/>
+                                        </p:tgtEl>
+                                      </p:cBhvr>
+                                    </p:animEffect>
+                                  </p:childTnLst>
+                                </p:cTn>
+                              </p:par>
+                            </p:childTnLst>
+                          </p:cTn>
+                        </p:par>
+                      </p:childTnLst>
+                    </p:cTn>
+                  </p:par>
+                </p:childTnLst>
+              </p:cTn>
+              <p:prevCondLst>
+                <p:cond evt="onPrev">
+                  <p:tgtEl>
+                    <p:sldTgt/>
+                  </p:tgtEl>
+                </p:cond>
+              </p:prevCondLst>
+              <p:nextCondLst>
+                <p:cond evt="onNext">
+                  <p:tgtEl>
+                    <p:sldTgt/>
+                  </p:tgtEl>
+                </p:cond>
+              </p:nextCondLst>
+            </p:seq>
+          </p:childTnLst>
+        </p:cTn>
+      </p:par>
+    </p:tnLst>
+  </p:timing>
+</p:sld>
+</file>
+
+<file path=ppt/slides/slide4.xml><?xml version="1.0" encoding="utf-8"?>
+<p:sld xmlns:a="http://schemas.openxmlformats.org/drawingml/2006/main" xmlns:r="http://schemas.openxmlformats.org/officeDocument/2006/relationships" xmlns:mc="http://schemas.openxmlformats.org/markup-compatibility/2006" xmlns:mv="urn:schemas-microsoft-com:mac:vml" xmlns:p="http://schemas.openxmlformats.org/presentationml/2006/main" xmlns:c="http://schemas.openxmlformats.org/drawingml/2006/chart" xmlns:dgm="http://schemas.openxmlformats.org/drawingml/2006/diagram" xmlns:o="urn:schemas-microsoft-com:office:office" xmlns:v="urn:schemas-microsoft-com:vml" xmlns:pvml="urn:schemas-microsoft-com:office:powerpoint" xmlns:com="http://schemas.openxmlformats.org/drawingml/2006/compatibility" xmlns:p14="http://schemas.microsoft.com/office/powerpoint/2010/main" xmlns:p15="http://schemas.microsoft.com/office/powerpoint/2012/main">
+  <p:cSld>
+    <p:spTree>
+      <p:nvGrpSpPr>
+        <p:cNvPr id="95" name="Shape 95"/>
+        <p:cNvGrpSpPr/>
+        <p:nvPr/>
+      </p:nvGrpSpPr>
+      <p:grpSpPr>
+        <a:xfrm>
+          <a:off x="0" y="0"/>
+          <a:ext cx="0" cy="0"/>
+          <a:chOff x="0" y="0"/>
+          <a:chExt cx="0" cy="0"/>
+        </a:xfrm>
+      </p:grpSpPr>
+      <p:sp>
+        <p:nvSpPr>
+          <p:cNvPr id="96" name="Google Shape;96;p16"/>
+          <p:cNvSpPr/>
+          <p:nvPr/>
+        </p:nvSpPr>
+        <p:spPr>
+          <a:xfrm>
+            <a:off x="-179682" y="-308191"/>
+            <a:ext cx="9647400" cy="1688700"/>
+          </a:xfrm>
+          <a:prstGeom prst="rect">
+            <a:avLst/>
+          </a:prstGeom>
+          <a:solidFill>
+            <a:srgbClr val="002645"/>
+          </a:solidFill>
+          <a:ln>
+            <a:noFill/>
+          </a:ln>
+          <a:effectLst>
+            <a:outerShdw blurRad="50800" rotWithShape="0" dir="5400000" dist="38100">
+              <a:srgbClr val="000000">
+                <a:alpha val="40000"/>
+              </a:srgbClr>
+            </a:outerShdw>
+          </a:effectLst>
+        </p:spPr>
+        <p:txBody>
+          <a:bodyPr anchorCtr="0" anchor="ctr" bIns="34275" lIns="34275" spcFirstLastPara="1" rIns="34275" wrap="square" tIns="34275">
+            <a:noAutofit/>
+          </a:bodyPr>
+          <a:lstStyle/>
+          <a:p>
+            <a:pPr indent="0" lvl="0" marL="0" marR="0" rtl="0" algn="ctr">
+              <a:lnSpc>
+                <a:spcPct val="100000"/>
+              </a:lnSpc>
+              <a:spcBef>
+                <a:spcPts val="0"/>
+              </a:spcBef>
+              <a:spcAft>
+                <a:spcPts val="0"/>
+              </a:spcAft>
+              <a:buClr>
+                <a:srgbClr val="FFFFFF"/>
+              </a:buClr>
+              <a:buSzPts val="1400"/>
+              <a:buFont typeface="Calibri"/>
+              <a:buNone/>
+            </a:pPr>
+            <a:r>
+              <a:t/>
+            </a:r>
+            <a:endParaRPr b="0" i="0" sz="1400" u="none" cap="none" strike="noStrike">
+              <a:solidFill>
+                <a:srgbClr val="FFFFFF"/>
+              </a:solidFill>
+              <a:latin typeface="Calibri"/>
+              <a:ea typeface="Calibri"/>
+              <a:cs typeface="Calibri"/>
+              <a:sym typeface="Calibri"/>
+            </a:endParaRPr>
+          </a:p>
+        </p:txBody>
+      </p:sp>
+      <p:sp>
+        <p:nvSpPr>
+          <p:cNvPr id="97" name="Google Shape;97;p16"/>
+          <p:cNvSpPr/>
+          <p:nvPr/>
+        </p:nvSpPr>
+        <p:spPr>
+          <a:xfrm>
+            <a:off x="228600" y="331700"/>
+            <a:ext cx="8915400" cy="468600"/>
+          </a:xfrm>
+          <a:prstGeom prst="rect">
+            <a:avLst/>
+          </a:prstGeom>
+          <a:noFill/>
+          <a:ln>
+            <a:noFill/>
+          </a:ln>
+        </p:spPr>
+        <p:txBody>
+          <a:bodyPr anchorCtr="0" anchor="t" bIns="34275" lIns="34275" spcFirstLastPara="1" rIns="34275" wrap="square" tIns="34275">
+            <a:noAutofit/>
+          </a:bodyPr>
+          <a:lstStyle/>
+          <a:p>
+            <a:pPr indent="0" lvl="0" marL="0" marR="0" rtl="0" algn="l">
+              <a:lnSpc>
+                <a:spcPct val="100000"/>
+              </a:lnSpc>
+              <a:spcBef>
+                <a:spcPts val="0"/>
+              </a:spcBef>
+              <a:spcAft>
+                <a:spcPts val="0"/>
+              </a:spcAft>
+              <a:buClr>
+                <a:srgbClr val="F2F2F2"/>
+              </a:buClr>
+              <a:buSzPts val="2600"/>
+              <a:buFont typeface="Open Sans"/>
+              <a:buNone/>
+            </a:pPr>
+            <a:r>
+              <a:rPr b="1" i="0" lang="en" sz="2600" u="none" cap="none" strike="noStrike">
+                <a:solidFill>
+                  <a:srgbClr val="F2F2F2"/>
+                </a:solidFill>
+                <a:latin typeface="Open Sans"/>
+                <a:ea typeface="Open Sans"/>
+                <a:cs typeface="Open Sans"/>
+                <a:sym typeface="Open Sans"/>
+              </a:rPr>
+              <a:t>AWS </a:t>
+            </a:r>
+            <a:r>
+              <a:rPr b="1" lang="en" sz="2600">
+                <a:solidFill>
+                  <a:srgbClr val="F2F2F2"/>
+                </a:solidFill>
+                <a:latin typeface="Open Sans"/>
+                <a:ea typeface="Open Sans"/>
+                <a:cs typeface="Open Sans"/>
+                <a:sym typeface="Open Sans"/>
+              </a:rPr>
+              <a:t>Data Analytics</a:t>
+            </a:r>
+            <a:r>
+              <a:rPr b="1" i="0" lang="en" sz="2600" u="none" cap="none" strike="noStrike">
+                <a:solidFill>
+                  <a:srgbClr val="F2F2F2"/>
+                </a:solidFill>
+                <a:latin typeface="Open Sans"/>
+                <a:ea typeface="Open Sans"/>
+                <a:cs typeface="Open Sans"/>
+                <a:sym typeface="Open Sans"/>
+              </a:rPr>
+              <a:t> - </a:t>
+            </a:r>
+            <a:r>
+              <a:rPr b="1" lang="en" sz="2100">
+                <a:solidFill>
+                  <a:srgbClr val="F2F2F2"/>
+                </a:solidFill>
+                <a:latin typeface="Open Sans"/>
+                <a:ea typeface="Open Sans"/>
+                <a:cs typeface="Open Sans"/>
+                <a:sym typeface="Open Sans"/>
+              </a:rPr>
+              <a:t>Introduction to Data Collection Systems</a:t>
+            </a:r>
+            <a:r>
+              <a:rPr b="1" i="0" lang="en" sz="2600" u="none" cap="none" strike="noStrike">
+                <a:solidFill>
+                  <a:srgbClr val="F2F2F2"/>
+                </a:solidFill>
+                <a:latin typeface="Open Sans"/>
+                <a:ea typeface="Open Sans"/>
+                <a:cs typeface="Open Sans"/>
+                <a:sym typeface="Open Sans"/>
+              </a:rPr>
+              <a:t> </a:t>
+            </a:r>
+            <a:endParaRPr b="0" i="0" sz="1100" u="none" cap="none" strike="noStrike">
+              <a:solidFill>
+                <a:srgbClr val="000000"/>
+              </a:solidFill>
+              <a:latin typeface="Arial"/>
+              <a:ea typeface="Arial"/>
+              <a:cs typeface="Arial"/>
+              <a:sym typeface="Arial"/>
+            </a:endParaRPr>
+          </a:p>
+        </p:txBody>
+      </p:sp>
+      <p:sp>
+        <p:nvSpPr>
+          <p:cNvPr id="98" name="Google Shape;98;p16"/>
+          <p:cNvSpPr/>
+          <p:nvPr/>
+        </p:nvSpPr>
+        <p:spPr>
+          <a:xfrm>
+            <a:off x="313771" y="843754"/>
+            <a:ext cx="2789700" cy="34200"/>
+          </a:xfrm>
+          <a:prstGeom prst="rect">
+            <a:avLst/>
+          </a:prstGeom>
+          <a:solidFill>
+            <a:srgbClr val="DE6E22"/>
+          </a:solidFill>
+          <a:ln>
+            <a:noFill/>
+          </a:ln>
+        </p:spPr>
+        <p:txBody>
+          <a:bodyPr anchorCtr="0" anchor="ctr" bIns="34275" lIns="34275" spcFirstLastPara="1" rIns="34275" wrap="square" tIns="34275">
+            <a:noAutofit/>
+          </a:bodyPr>
+          <a:lstStyle/>
+          <a:p>
+            <a:pPr indent="0" lvl="0" marL="0" marR="0" rtl="0" algn="ctr">
+              <a:lnSpc>
+                <a:spcPct val="100000"/>
+              </a:lnSpc>
+              <a:spcBef>
+                <a:spcPts val="0"/>
+              </a:spcBef>
+              <a:spcAft>
+                <a:spcPts val="0"/>
+              </a:spcAft>
+              <a:buClr>
+                <a:srgbClr val="FFFFFF"/>
+              </a:buClr>
+              <a:buSzPts val="1400"/>
+              <a:buFont typeface="Calibri"/>
+              <a:buNone/>
+            </a:pPr>
+            <a:r>
+              <a:t/>
+            </a:r>
+            <a:endParaRPr b="0" i="0" sz="1400" u="none" cap="none" strike="noStrike">
+              <a:solidFill>
+                <a:srgbClr val="FFFFFF"/>
+              </a:solidFill>
+              <a:latin typeface="Calibri"/>
+              <a:ea typeface="Calibri"/>
+              <a:cs typeface="Calibri"/>
+              <a:sym typeface="Calibri"/>
+            </a:endParaRPr>
+          </a:p>
+        </p:txBody>
+      </p:sp>
+      <p:sp>
+        <p:nvSpPr>
+          <p:cNvPr id="99" name="Google Shape;99;p16"/>
+          <p:cNvSpPr/>
+          <p:nvPr/>
+        </p:nvSpPr>
+        <p:spPr>
+          <a:xfrm>
+            <a:off x="228600" y="952975"/>
+            <a:ext cx="8724600" cy="335100"/>
+          </a:xfrm>
+          <a:prstGeom prst="rect">
+            <a:avLst/>
+          </a:prstGeom>
+          <a:noFill/>
+          <a:ln>
+            <a:noFill/>
+          </a:ln>
+        </p:spPr>
+        <p:txBody>
+          <a:bodyPr anchorCtr="0" anchor="t" bIns="34275" lIns="34275" spcFirstLastPara="1" rIns="34275" wrap="square" tIns="34275">
+            <a:noAutofit/>
+          </a:bodyPr>
+          <a:lstStyle/>
+          <a:p>
+            <a:pPr indent="0" lvl="0" marL="0" marR="0" rtl="0" algn="l">
+              <a:lnSpc>
+                <a:spcPct val="100000"/>
+              </a:lnSpc>
+              <a:spcBef>
+                <a:spcPts val="0"/>
+              </a:spcBef>
+              <a:spcAft>
+                <a:spcPts val="0"/>
+              </a:spcAft>
+              <a:buClr>
+                <a:srgbClr val="D9D9D9"/>
+              </a:buClr>
+              <a:buSzPts val="1700"/>
+              <a:buFont typeface="Open Sans"/>
+              <a:buNone/>
+            </a:pPr>
+            <a:r>
+              <a:rPr b="0" i="0" lang="en" sz="1700" u="none" cap="none" strike="noStrike">
+                <a:solidFill>
+                  <a:srgbClr val="D9D9D9"/>
+                </a:solidFill>
+                <a:latin typeface="Open Sans"/>
+                <a:ea typeface="Open Sans"/>
+                <a:cs typeface="Open Sans"/>
+                <a:sym typeface="Open Sans"/>
+              </a:rPr>
+              <a:t>Introduction -</a:t>
+            </a:r>
+            <a:r>
+              <a:rPr lang="en" sz="1700">
+                <a:solidFill>
+                  <a:srgbClr val="D9D9D9"/>
+                </a:solidFill>
+                <a:latin typeface="Open Sans"/>
+                <a:ea typeface="Open Sans"/>
+                <a:cs typeface="Open Sans"/>
+                <a:sym typeface="Open Sans"/>
+              </a:rPr>
+              <a:t> </a:t>
+            </a:r>
+            <a:r>
+              <a:rPr lang="en">
+                <a:solidFill>
+                  <a:srgbClr val="D9D9D9"/>
+                </a:solidFill>
+                <a:latin typeface="Open Sans"/>
+                <a:ea typeface="Open Sans"/>
+                <a:cs typeface="Open Sans"/>
+                <a:sym typeface="Open Sans"/>
+              </a:rPr>
+              <a:t>Select a collection system that handles the frequency, volume, and source of data</a:t>
+            </a:r>
+            <a:endParaRPr b="0" i="0" sz="800" u="none" cap="none" strike="noStrike">
+              <a:solidFill>
+                <a:srgbClr val="000000"/>
+              </a:solidFill>
+              <a:latin typeface="Arial"/>
+              <a:ea typeface="Arial"/>
+              <a:cs typeface="Arial"/>
+              <a:sym typeface="Arial"/>
+            </a:endParaRPr>
+          </a:p>
+        </p:txBody>
+      </p:sp>
+      <p:pic>
+        <p:nvPicPr>
+          <p:cNvPr id="100" name="Google Shape;100;p16"/>
+          <p:cNvPicPr preferRelativeResize="0"/>
+          <p:nvPr/>
+        </p:nvPicPr>
+        <p:blipFill rotWithShape="1">
+          <a:blip r:embed="rId3">
+            <a:alphaModFix/>
+          </a:blip>
+          <a:srcRect b="0" l="0" r="0" t="0"/>
+          <a:stretch/>
+        </p:blipFill>
+        <p:spPr>
+          <a:xfrm>
+            <a:off x="8325525" y="4593059"/>
+            <a:ext cx="752475" cy="495300"/>
+          </a:xfrm>
+          <a:prstGeom prst="rect">
+            <a:avLst/>
+          </a:prstGeom>
+          <a:noFill/>
+          <a:ln>
+            <a:noFill/>
+          </a:ln>
+        </p:spPr>
+      </p:pic>
+      <p:sp>
+        <p:nvSpPr>
+          <p:cNvPr id="101" name="Google Shape;101;p16"/>
+          <p:cNvSpPr txBox="1"/>
+          <p:nvPr/>
+        </p:nvSpPr>
+        <p:spPr>
+          <a:xfrm>
+            <a:off x="708850" y="1660875"/>
+            <a:ext cx="7543500" cy="335100"/>
+          </a:xfrm>
+          <a:prstGeom prst="rect">
+            <a:avLst/>
+          </a:prstGeom>
+          <a:noFill/>
+          <a:ln>
+            <a:noFill/>
+          </a:ln>
+        </p:spPr>
+        <p:txBody>
+          <a:bodyPr anchorCtr="0" anchor="t" bIns="91425" lIns="91425" spcFirstLastPara="1" rIns="91425" wrap="square" tIns="91425">
+            <a:noAutofit/>
+          </a:bodyPr>
+          <a:lstStyle/>
+          <a:p>
+            <a:pPr indent="-317500" lvl="0" marL="457200" marR="0" rtl="0" algn="l">
+              <a:lnSpc>
+                <a:spcPct val="100000"/>
+              </a:lnSpc>
+              <a:spcBef>
+                <a:spcPts val="0"/>
+              </a:spcBef>
+              <a:spcAft>
+                <a:spcPts val="0"/>
+              </a:spcAft>
+              <a:buClr>
+                <a:srgbClr val="000000"/>
+              </a:buClr>
+              <a:buSzPts val="1400"/>
+              <a:buFont typeface="Arial"/>
+              <a:buChar char="❏"/>
+            </a:pPr>
+            <a:r>
+              <a:rPr lang="en"/>
+              <a:t>Select a collection system that handles the frequency, volume, and source of data</a:t>
+            </a:r>
+            <a:endParaRPr b="0" i="0" sz="1400" u="none" cap="none" strike="noStrike">
+              <a:solidFill>
+                <a:srgbClr val="000000"/>
+              </a:solidFill>
+              <a:latin typeface="Arial"/>
+              <a:ea typeface="Arial"/>
+              <a:cs typeface="Arial"/>
+              <a:sym typeface="Arial"/>
+            </a:endParaRPr>
+          </a:p>
+        </p:txBody>
+      </p:sp>
+      <p:sp>
+        <p:nvSpPr>
+          <p:cNvPr id="102" name="Google Shape;102;p16"/>
+          <p:cNvSpPr txBox="1"/>
+          <p:nvPr/>
+        </p:nvSpPr>
+        <p:spPr>
+          <a:xfrm>
+            <a:off x="1013650" y="1965675"/>
+            <a:ext cx="6743100" cy="335100"/>
+          </a:xfrm>
+          <a:prstGeom prst="rect">
+            <a:avLst/>
+          </a:prstGeom>
+          <a:noFill/>
+          <a:ln>
+            <a:noFill/>
+          </a:ln>
+        </p:spPr>
+        <p:txBody>
+          <a:bodyPr anchorCtr="0" anchor="t" bIns="91425" lIns="91425" spcFirstLastPara="1" rIns="91425" wrap="square" tIns="91425">
+            <a:noAutofit/>
+          </a:bodyPr>
+          <a:lstStyle/>
+          <a:p>
+            <a:pPr indent="-317500" lvl="0" marL="457200" marR="0" rtl="0" algn="l">
+              <a:lnSpc>
+                <a:spcPct val="100000"/>
+              </a:lnSpc>
+              <a:spcBef>
+                <a:spcPts val="0"/>
+              </a:spcBef>
+              <a:spcAft>
+                <a:spcPts val="0"/>
+              </a:spcAft>
+              <a:buClr>
+                <a:srgbClr val="000000"/>
+              </a:buClr>
+              <a:buSzPts val="1400"/>
+              <a:buFont typeface="Arial"/>
+              <a:buChar char="❏"/>
+            </a:pPr>
+            <a:r>
+              <a:rPr lang="en"/>
+              <a:t>Batch, streaming, and transactional data</a:t>
+            </a:r>
+            <a:endParaRPr b="0" i="0" sz="1400" u="none" cap="none" strike="noStrike">
+              <a:solidFill>
+                <a:srgbClr val="000000"/>
+              </a:solidFill>
+              <a:latin typeface="Arial"/>
+              <a:ea typeface="Arial"/>
+              <a:cs typeface="Arial"/>
+              <a:sym typeface="Arial"/>
+            </a:endParaRPr>
+          </a:p>
+        </p:txBody>
+      </p:sp>
+      <p:sp>
+        <p:nvSpPr>
+          <p:cNvPr id="103" name="Google Shape;103;p16"/>
+          <p:cNvSpPr txBox="1"/>
+          <p:nvPr/>
+        </p:nvSpPr>
+        <p:spPr>
+          <a:xfrm>
+            <a:off x="1013650" y="2956275"/>
+            <a:ext cx="6743100" cy="335100"/>
+          </a:xfrm>
+          <a:prstGeom prst="rect">
+            <a:avLst/>
+          </a:prstGeom>
+          <a:noFill/>
+          <a:ln>
+            <a:noFill/>
+          </a:ln>
+        </p:spPr>
+        <p:txBody>
+          <a:bodyPr anchorCtr="0" anchor="t" bIns="91425" lIns="91425" spcFirstLastPara="1" rIns="91425" wrap="square" tIns="91425">
+            <a:noAutofit/>
+          </a:bodyPr>
+          <a:lstStyle/>
+          <a:p>
+            <a:pPr indent="-317500" lvl="0" marL="457200" marR="0" rtl="0" algn="l">
+              <a:lnSpc>
+                <a:spcPct val="100000"/>
+              </a:lnSpc>
+              <a:spcBef>
+                <a:spcPts val="0"/>
+              </a:spcBef>
+              <a:spcAft>
+                <a:spcPts val="0"/>
+              </a:spcAft>
+              <a:buClr>
+                <a:srgbClr val="000000"/>
+              </a:buClr>
+              <a:buSzPts val="1400"/>
+              <a:buFont typeface="Arial"/>
+              <a:buChar char="❏"/>
+            </a:pPr>
+            <a:r>
+              <a:rPr lang="en"/>
+              <a:t>Compare data collection systems</a:t>
+            </a:r>
+            <a:endParaRPr b="0" i="0" sz="1400" u="none" cap="none" strike="noStrike">
+              <a:solidFill>
+                <a:srgbClr val="000000"/>
+              </a:solidFill>
+              <a:latin typeface="Arial"/>
+              <a:ea typeface="Arial"/>
+              <a:cs typeface="Arial"/>
+              <a:sym typeface="Arial"/>
+            </a:endParaRPr>
+          </a:p>
+        </p:txBody>
+      </p:sp>
+      <p:pic>
+        <p:nvPicPr>
+          <p:cNvPr id="104" name="Google Shape;104;p16">
+            <a:hlinkClick r:id="rId4"/>
+          </p:cNvPr>
+          <p:cNvPicPr preferRelativeResize="0"/>
+          <p:nvPr/>
+        </p:nvPicPr>
+        <p:blipFill>
+          <a:blip r:embed="rId5">
+            <a:alphaModFix/>
+          </a:blip>
+          <a:stretch>
+            <a:fillRect/>
+          </a:stretch>
+        </p:blipFill>
+        <p:spPr>
+          <a:xfrm>
+            <a:off x="4727960" y="2157276"/>
+            <a:ext cx="4317619" cy="828950"/>
+          </a:xfrm>
+          <a:prstGeom prst="rect">
+            <a:avLst/>
+          </a:prstGeom>
+          <a:noFill/>
+          <a:ln>
+            <a:noFill/>
+          </a:ln>
+        </p:spPr>
+      </p:pic>
+      <p:pic>
+        <p:nvPicPr>
+          <p:cNvPr id="105" name="Google Shape;105;p16">
+            <a:hlinkClick r:id="rId6"/>
+          </p:cNvPr>
+          <p:cNvPicPr preferRelativeResize="0"/>
+          <p:nvPr/>
+        </p:nvPicPr>
+        <p:blipFill>
+          <a:blip r:embed="rId7">
+            <a:alphaModFix/>
+          </a:blip>
+          <a:stretch>
+            <a:fillRect/>
+          </a:stretch>
+        </p:blipFill>
+        <p:spPr>
+          <a:xfrm>
+            <a:off x="5148350" y="3092887"/>
+            <a:ext cx="3727472" cy="708049"/>
+          </a:xfrm>
+          <a:prstGeom prst="rect">
+            <a:avLst/>
+          </a:prstGeom>
+          <a:noFill/>
+          <a:ln>
+            <a:noFill/>
+          </a:ln>
+        </p:spPr>
+      </p:pic>
+      <p:pic>
+        <p:nvPicPr>
+          <p:cNvPr id="106" name="Google Shape;106;p16">
+            <a:hlinkClick r:id="rId8"/>
+          </p:cNvPr>
+          <p:cNvPicPr preferRelativeResize="0"/>
+          <p:nvPr/>
+        </p:nvPicPr>
+        <p:blipFill>
+          <a:blip r:embed="rId9">
+            <a:alphaModFix/>
+          </a:blip>
+          <a:stretch>
+            <a:fillRect/>
+          </a:stretch>
+        </p:blipFill>
+        <p:spPr>
+          <a:xfrm>
+            <a:off x="5348325" y="3952475"/>
+            <a:ext cx="3076872" cy="583901"/>
+          </a:xfrm>
+          <a:prstGeom prst="rect">
+            <a:avLst/>
+          </a:prstGeom>
+          <a:noFill/>
+          <a:ln>
+            <a:noFill/>
+          </a:ln>
+        </p:spPr>
+      </p:pic>
+      <p:pic>
+        <p:nvPicPr>
+          <p:cNvPr id="107" name="Google Shape;107;p16">
+            <a:hlinkClick r:id="rId10"/>
+          </p:cNvPr>
+          <p:cNvPicPr preferRelativeResize="0"/>
+          <p:nvPr/>
+        </p:nvPicPr>
+        <p:blipFill>
+          <a:blip r:embed="rId11">
+            <a:alphaModFix/>
+          </a:blip>
+          <a:stretch>
+            <a:fillRect/>
+          </a:stretch>
+        </p:blipFill>
+        <p:spPr>
+          <a:xfrm>
+            <a:off x="1375275" y="3430426"/>
+            <a:ext cx="3352676" cy="1037350"/>
+          </a:xfrm>
+          <a:prstGeom prst="rect">
+            <a:avLst/>
+          </a:prstGeom>
+          <a:noFill/>
+          <a:ln>
+            <a:noFill/>
+          </a:ln>
+        </p:spPr>
+      </p:pic>
+    </p:spTree>
+  </p:cSld>
+  <p:clrMapOvr>
+    <a:masterClrMapping/>
+  </p:clrMapOvr>
+  <p:timing>
+    <p:tnLst>
+      <p:par>
+        <p:cTn dur="indefinite" nodeType="tmRoot" restart="never">
+          <p:childTnLst>
+            <p:seq concurrent="1" nextAc="seek">
+              <p:cTn dur="indefinite" id="2" nodeType="mainSeq">
+                <p:childTnLst>
+                  <p:par>
+                    <p:cTn fill="hold">
+                      <p:stCondLst>
+                        <p:cond delay="indefinite"/>
+                      </p:stCondLst>
+                      <p:childTnLst>
+                        <p:par>
+                          <p:cTn fill="hold">
+                            <p:stCondLst>
+                              <p:cond delay="0"/>
+                            </p:stCondLst>
+                            <p:childTnLst>
+                              <p:par>
+                                <p:cTn fill="hold" nodeType="clickEffect" presetClass="entr" presetID="10" presetSubtype="0">
+                                  <p:stCondLst>
+                                    <p:cond delay="0"/>
+                                  </p:stCondLst>
+                                  <p:childTnLst>
+                                    <p:set>
+                                      <p:cBhvr>
+                                        <p:cTn dur="1" fill="hold">
+                                          <p:stCondLst>
+                                            <p:cond delay="0"/>
+                                          </p:stCondLst>
+                                        </p:cTn>
+                                        <p:tgtEl>
+                                          <p:spTgt spid="101"/>
+                                        </p:tgtEl>
+                                        <p:attrNameLst>
+                                          <p:attrName>style.visibility</p:attrName>
+                                        </p:attrNameLst>
+                                      </p:cBhvr>
+                                      <p:to>
+                                        <p:strVal val="visible"/>
+                                      </p:to>
+                                    </p:set>
+                                    <p:animEffect filter="fade" transition="in">
+                                      <p:cBhvr>
+                                        <p:cTn dur="1000"/>
+                                        <p:tgtEl>
+                                          <p:spTgt spid="101"/>
+                                        </p:tgtEl>
+                                      </p:cBhvr>
+                                    </p:animEffect>
+                                  </p:childTnLst>
+                                </p:cTn>
+                              </p:par>
+                            </p:childTnLst>
+                          </p:cTn>
+                        </p:par>
+                      </p:childTnLst>
+                    </p:cTn>
+                  </p:par>
+                  <p:par>
+                    <p:cTn fill="hold">
+                      <p:stCondLst>
+                        <p:cond delay="indefinite"/>
+                      </p:stCondLst>
+                      <p:childTnLst>
+                        <p:par>
+                          <p:cTn fill="hold">
+                            <p:stCondLst>
+                              <p:cond delay="0"/>
+                            </p:stCondLst>
+                            <p:childTnLst>
+                              <p:par>
+                                <p:cTn fill="hold" nodeType="clickEffect" presetClass="entr" presetID="10" presetSubtype="0">
+                                  <p:stCondLst>
+                                    <p:cond delay="0"/>
+                                  </p:stCondLst>
+                                  <p:childTnLst>
+                                    <p:set>
+                                      <p:cBhvr>
+                                        <p:cTn dur="1" fill="hold">
+                                          <p:stCondLst>
+                                            <p:cond delay="0"/>
+                                          </p:stCondLst>
+                                        </p:cTn>
+                                        <p:tgtEl>
+                                          <p:spTgt spid="102"/>
+                                        </p:tgtEl>
+                                        <p:attrNameLst>
+                                          <p:attrName>style.visibility</p:attrName>
+                                        </p:attrNameLst>
+                                      </p:cBhvr>
+                                      <p:to>
+                                        <p:strVal val="visible"/>
+                                      </p:to>
+                                    </p:set>
+                                    <p:animEffect filter="fade" transition="in">
+                                      <p:cBhvr>
+                                        <p:cTn dur="1000"/>
+                                        <p:tgtEl>
+                                          <p:spTgt spid="102"/>
+                                        </p:tgtEl>
+                                      </p:cBhvr>
+                                    </p:animEffect>
+                                  </p:childTnLst>
+                                </p:cTn>
+                              </p:par>
+                              <p:par>
+                                <p:cTn fill="hold" nodeType="withEffect" presetClass="entr" presetID="10" presetSubtype="0">
+                                  <p:stCondLst>
+                                    <p:cond delay="0"/>
+                                  </p:stCondLst>
+                                  <p:childTnLst>
+                                    <p:set>
+                                      <p:cBhvr>
+                                        <p:cTn dur="1" fill="hold">
+                                          <p:stCondLst>
+                                            <p:cond delay="0"/>
+                                          </p:stCondLst>
+                                        </p:cTn>
+                                        <p:tgtEl>
+                                          <p:spTgt spid="104"/>
+                                        </p:tgtEl>
+                                        <p:attrNameLst>
+                                          <p:attrName>style.visibility</p:attrName>
+                                        </p:attrNameLst>
+                                      </p:cBhvr>
+                                      <p:to>
+                                        <p:strVal val="visible"/>
+                                      </p:to>
+                                    </p:set>
+                                    <p:animEffect filter="fade" transition="in">
+                                      <p:cBhvr>
+                                        <p:cTn dur="1000"/>
+                                        <p:tgtEl>
+                                          <p:spTgt spid="104"/>
+                                        </p:tgtEl>
+                                      </p:cBhvr>
+                                    </p:animEffect>
+                                  </p:childTnLst>
+                                </p:cTn>
+                              </p:par>
+                            </p:childTnLst>
+                          </p:cTn>
+                        </p:par>
+                      </p:childTnLst>
+                    </p:cTn>
+                  </p:par>
+                  <p:par>
+                    <p:cTn fill="hold">
+                      <p:stCondLst>
+                        <p:cond delay="indefinite"/>
+                      </p:stCondLst>
+                      <p:childTnLst>
+                        <p:par>
+                          <p:cTn fill="hold">
+                            <p:stCondLst>
+                              <p:cond delay="0"/>
+                            </p:stCondLst>
+                            <p:childTnLst>
+                              <p:par>
+                                <p:cTn fill="hold" nodeType="clickEffect" presetClass="entr" presetID="10" presetSubtype="0">
+                                  <p:stCondLst>
+                                    <p:cond delay="0"/>
+                                  </p:stCondLst>
+                                  <p:childTnLst>
+                                    <p:set>
+                                      <p:cBhvr>
+                                        <p:cTn dur="1" fill="hold">
+                                          <p:stCondLst>
+                                            <p:cond delay="0"/>
+                                          </p:stCondLst>
+                                        </p:cTn>
+                                        <p:tgtEl>
+                                          <p:spTgt spid="105"/>
+                                        </p:tgtEl>
+                                        <p:attrNameLst>
+                                          <p:attrName>style.visibility</p:attrName>
+                                        </p:attrNameLst>
+                                      </p:cBhvr>
+                                      <p:to>
+                                        <p:strVal val="visible"/>
+                                      </p:to>
+                                    </p:set>
+                                    <p:animEffect filter="fade" transition="in">
+                                      <p:cBhvr>
+                                        <p:cTn dur="1000"/>
+                                        <p:tgtEl>
+                                          <p:spTgt spid="105"/>
+                                        </p:tgtEl>
+                                      </p:cBhvr>
+                                    </p:animEffect>
+                                  </p:childTnLst>
+                                </p:cTn>
+                              </p:par>
+                            </p:childTnLst>
+                          </p:cTn>
+                        </p:par>
+                      </p:childTnLst>
+                    </p:cTn>
+                  </p:par>
+                  <p:par>
+                    <p:cTn fill="hold">
+                      <p:stCondLst>
+                        <p:cond delay="indefinite"/>
+                      </p:stCondLst>
+                      <p:childTnLst>
+                        <p:par>
+                          <p:cTn fill="hold">
+                            <p:stCondLst>
+                              <p:cond delay="0"/>
+                            </p:stCondLst>
+                            <p:childTnLst>
+                              <p:par>
+                                <p:cTn fill="hold" nodeType="clickEffect" presetClass="entr" presetID="10" presetSubtype="0">
+                                  <p:stCondLst>
+                                    <p:cond delay="0"/>
+                                  </p:stCondLst>
+                                  <p:childTnLst>
+                                    <p:set>
+                                      <p:cBhvr>
+                                        <p:cTn dur="1" fill="hold">
+                                          <p:stCondLst>
+                                            <p:cond delay="0"/>
+                                          </p:stCondLst>
+                                        </p:cTn>
+                                        <p:tgtEl>
+                                          <p:spTgt spid="106"/>
+                                        </p:tgtEl>
+                                        <p:attrNameLst>
+                                          <p:attrName>style.visibility</p:attrName>
+                                        </p:attrNameLst>
+                                      </p:cBhvr>
+                                      <p:to>
+                                        <p:strVal val="visible"/>
+                                      </p:to>
+                                    </p:set>
+                                    <p:animEffect filter="fade" transition="in">
+                                      <p:cBhvr>
+                                        <p:cTn dur="1000"/>
+                                        <p:tgtEl>
+                                          <p:spTgt spid="106"/>
+                                        </p:tgtEl>
+                                      </p:cBhvr>
+                                    </p:animEffect>
+                                  </p:childTnLst>
+                                </p:cTn>
+                              </p:par>
+                            </p:childTnLst>
+                          </p:cTn>
+                        </p:par>
+                      </p:childTnLst>
+                    </p:cTn>
+                  </p:par>
+                  <p:par>
+                    <p:cTn fill="hold">
+                      <p:stCondLst>
+                        <p:cond delay="indefinite"/>
+                      </p:stCondLst>
+                      <p:childTnLst>
+                        <p:par>
+                          <p:cTn fill="hold">
+                            <p:stCondLst>
+                              <p:cond delay="0"/>
+                            </p:stCondLst>
+                            <p:childTnLst>
+                              <p:par>
+                                <p:cTn fill="hold" nodeType="clickEffect" presetClass="entr" presetID="10" presetSubtype="0">
+                                  <p:stCondLst>
+                                    <p:cond delay="0"/>
+                                  </p:stCondLst>
+                                  <p:childTnLst>
+                                    <p:set>
+                                      <p:cBhvr>
+                                        <p:cTn dur="1" fill="hold">
+                                          <p:stCondLst>
+                                            <p:cond delay="0"/>
+                                          </p:stCondLst>
+                                        </p:cTn>
+                                        <p:tgtEl>
+                                          <p:spTgt spid="103"/>
+                                        </p:tgtEl>
+                                        <p:attrNameLst>
+                                          <p:attrName>style.visibility</p:attrName>
+                                        </p:attrNameLst>
+                                      </p:cBhvr>
+                                      <p:to>
+                                        <p:strVal val="visible"/>
+                                      </p:to>
+                                    </p:set>
+                                    <p:animEffect filter="fade" transition="in">
+                                      <p:cBhvr>
+                                        <p:cTn dur="1000"/>
+                                        <p:tgtEl>
+                                          <p:spTgt spid="103"/>
+                                        </p:tgtEl>
+                                      </p:cBhvr>
+                                    </p:animEffect>
+                                  </p:childTnLst>
+                                </p:cTn>
+                              </p:par>
+                              <p:par>
+                                <p:cTn fill="hold" nodeType="withEffect" presetClass="entr" presetID="10" presetSubtype="0">
+                                  <p:stCondLst>
+                                    <p:cond delay="0"/>
+                                  </p:stCondLst>
+                                  <p:childTnLst>
+                                    <p:set>
+                                      <p:cBhvr>
+                                        <p:cTn dur="1" fill="hold">
+                                          <p:stCondLst>
+                                            <p:cond delay="0"/>
+                                          </p:stCondLst>
+                                        </p:cTn>
+                                        <p:tgtEl>
+                                          <p:spTgt spid="107"/>
+                                        </p:tgtEl>
+                                        <p:attrNameLst>
+                                          <p:attrName>style.visibility</p:attrName>
+                                        </p:attrNameLst>
+                                      </p:cBhvr>
+                                      <p:to>
+                                        <p:strVal val="visible"/>
+                                      </p:to>
+                                    </p:set>
+                                    <p:animEffect filter="fade" transition="in">
+                                      <p:cBhvr>
+                                        <p:cTn dur="1000"/>
+                                        <p:tgtEl>
+                                          <p:spTgt spid="107"/>
+                                        </p:tgtEl>
+                                      </p:cBhvr>
+                                    </p:animEffect>
+                                  </p:childTnLst>
+                                </p:cTn>
+                              </p:par>
+                            </p:childTnLst>
+                          </p:cTn>
+                        </p:par>
+                      </p:childTnLst>
+                    </p:cTn>
+                  </p:par>
+                </p:childTnLst>
+              </p:cTn>
+              <p:prevCondLst>
+                <p:cond evt="onPrev">
+                  <p:tgtEl>
+                    <p:sldTgt/>
+                  </p:tgtEl>
+                </p:cond>
+              </p:prevCondLst>
+              <p:nextCondLst>
+                <p:cond evt="onNext">
+                  <p:tgtEl>
+                    <p:sldTgt/>
+                  </p:tgtEl>
+                </p:cond>
+              </p:nextCondLst>
+            </p:seq>
+          </p:childTnLst>
+        </p:cTn>
+      </p:par>
+    </p:tnLst>
+  </p:timing>
+</p:sld>
+</file>
+
+<file path=ppt/slides/slide5.xml><?xml version="1.0" encoding="utf-8"?>
+<p:sld xmlns:a="http://schemas.openxmlformats.org/drawingml/2006/main" xmlns:r="http://schemas.openxmlformats.org/officeDocument/2006/relationships" xmlns:mc="http://schemas.openxmlformats.org/markup-compatibility/2006" xmlns:mv="urn:schemas-microsoft-com:mac:vml" xmlns:p="http://schemas.openxmlformats.org/presentationml/2006/main" xmlns:c="http://schemas.openxmlformats.org/drawingml/2006/chart" xmlns:dgm="http://schemas.openxmlformats.org/drawingml/2006/diagram" xmlns:o="urn:schemas-microsoft-com:office:office" xmlns:v="urn:schemas-microsoft-com:vml" xmlns:pvml="urn:schemas-microsoft-com:office:powerpoint" xmlns:com="http://schemas.openxmlformats.org/drawingml/2006/compatibility" xmlns:p14="http://schemas.microsoft.com/office/powerpoint/2010/main" xmlns:p15="http://schemas.microsoft.com/office/powerpoint/2012/main">
+  <p:cSld>
+    <p:spTree>
+      <p:nvGrpSpPr>
+        <p:cNvPr id="111" name="Shape 111"/>
+        <p:cNvGrpSpPr/>
+        <p:nvPr/>
+      </p:nvGrpSpPr>
+      <p:grpSpPr>
+        <a:xfrm>
+          <a:off x="0" y="0"/>
+          <a:ext cx="0" cy="0"/>
+          <a:chOff x="0" y="0"/>
+          <a:chExt cx="0" cy="0"/>
+        </a:xfrm>
+      </p:grpSpPr>
+      <p:sp>
+        <p:nvSpPr>
+          <p:cNvPr id="112" name="Google Shape;112;p17"/>
+          <p:cNvSpPr/>
+          <p:nvPr/>
+        </p:nvSpPr>
+        <p:spPr>
+          <a:xfrm>
+            <a:off x="-179682" y="-308191"/>
+            <a:ext cx="9647400" cy="1688700"/>
+          </a:xfrm>
+          <a:prstGeom prst="rect">
+            <a:avLst/>
+          </a:prstGeom>
+          <a:solidFill>
+            <a:srgbClr val="002645"/>
+          </a:solidFill>
+          <a:ln>
+            <a:noFill/>
+          </a:ln>
+          <a:effectLst>
+            <a:outerShdw blurRad="50800" rotWithShape="0" dir="5400000" dist="38100">
+              <a:srgbClr val="000000">
+                <a:alpha val="40000"/>
+              </a:srgbClr>
+            </a:outerShdw>
+          </a:effectLst>
+        </p:spPr>
+        <p:txBody>
+          <a:bodyPr anchorCtr="0" anchor="ctr" bIns="34275" lIns="34275" spcFirstLastPara="1" rIns="34275" wrap="square" tIns="34275">
+            <a:noAutofit/>
+          </a:bodyPr>
+          <a:lstStyle/>
+          <a:p>
+            <a:pPr indent="0" lvl="0" marL="0" marR="0" rtl="0" algn="ctr">
+              <a:lnSpc>
+                <a:spcPct val="100000"/>
+              </a:lnSpc>
+              <a:spcBef>
+                <a:spcPts val="0"/>
+              </a:spcBef>
+              <a:spcAft>
+                <a:spcPts val="0"/>
+              </a:spcAft>
+              <a:buClr>
+                <a:srgbClr val="FFFFFF"/>
+              </a:buClr>
+              <a:buSzPts val="1400"/>
+              <a:buFont typeface="Calibri"/>
+              <a:buNone/>
+            </a:pPr>
+            <a:r>
+              <a:t/>
+            </a:r>
+            <a:endParaRPr b="0" i="0" sz="1400" u="none" cap="none" strike="noStrike">
+              <a:solidFill>
+                <a:srgbClr val="FFFFFF"/>
+              </a:solidFill>
+              <a:latin typeface="Calibri"/>
+              <a:ea typeface="Calibri"/>
+              <a:cs typeface="Calibri"/>
+              <a:sym typeface="Calibri"/>
+            </a:endParaRPr>
+          </a:p>
+        </p:txBody>
+      </p:sp>
+      <p:sp>
+        <p:nvSpPr>
+          <p:cNvPr id="113" name="Google Shape;113;p17"/>
+          <p:cNvSpPr/>
+          <p:nvPr/>
+        </p:nvSpPr>
+        <p:spPr>
+          <a:xfrm>
+            <a:off x="228600" y="331700"/>
+            <a:ext cx="8915400" cy="468600"/>
+          </a:xfrm>
+          <a:prstGeom prst="rect">
+            <a:avLst/>
+          </a:prstGeom>
+          <a:noFill/>
+          <a:ln>
+            <a:noFill/>
+          </a:ln>
+        </p:spPr>
+        <p:txBody>
+          <a:bodyPr anchorCtr="0" anchor="t" bIns="34275" lIns="34275" spcFirstLastPara="1" rIns="34275" wrap="square" tIns="34275">
+            <a:noAutofit/>
+          </a:bodyPr>
+          <a:lstStyle/>
+          <a:p>
+            <a:pPr indent="0" lvl="0" marL="0" marR="0" rtl="0" algn="l">
+              <a:lnSpc>
+                <a:spcPct val="100000"/>
+              </a:lnSpc>
+              <a:spcBef>
+                <a:spcPts val="0"/>
+              </a:spcBef>
+              <a:spcAft>
+                <a:spcPts val="0"/>
+              </a:spcAft>
+              <a:buClr>
+                <a:srgbClr val="F2F2F2"/>
+              </a:buClr>
+              <a:buSzPts val="2600"/>
+              <a:buFont typeface="Open Sans"/>
+              <a:buNone/>
+            </a:pPr>
+            <a:r>
+              <a:rPr b="1" i="0" lang="en" sz="2600" u="none" cap="none" strike="noStrike">
+                <a:solidFill>
+                  <a:srgbClr val="F2F2F2"/>
+                </a:solidFill>
+                <a:latin typeface="Open Sans"/>
+                <a:ea typeface="Open Sans"/>
+                <a:cs typeface="Open Sans"/>
+                <a:sym typeface="Open Sans"/>
+              </a:rPr>
+              <a:t>AWS </a:t>
+            </a:r>
+            <a:r>
+              <a:rPr b="1" lang="en" sz="2600">
+                <a:solidFill>
+                  <a:srgbClr val="F2F2F2"/>
+                </a:solidFill>
+                <a:latin typeface="Open Sans"/>
+                <a:ea typeface="Open Sans"/>
+                <a:cs typeface="Open Sans"/>
+                <a:sym typeface="Open Sans"/>
+              </a:rPr>
+              <a:t>Data Analytics</a:t>
+            </a:r>
+            <a:r>
+              <a:rPr b="1" i="0" lang="en" sz="2600" u="none" cap="none" strike="noStrike">
+                <a:solidFill>
+                  <a:srgbClr val="F2F2F2"/>
+                </a:solidFill>
+                <a:latin typeface="Open Sans"/>
+                <a:ea typeface="Open Sans"/>
+                <a:cs typeface="Open Sans"/>
+                <a:sym typeface="Open Sans"/>
+              </a:rPr>
+              <a:t> - </a:t>
+            </a:r>
+            <a:r>
+              <a:rPr b="1" lang="en" sz="2100">
+                <a:solidFill>
+                  <a:srgbClr val="F2F2F2"/>
+                </a:solidFill>
+                <a:latin typeface="Open Sans"/>
+                <a:ea typeface="Open Sans"/>
+                <a:cs typeface="Open Sans"/>
+                <a:sym typeface="Open Sans"/>
+              </a:rPr>
+              <a:t>Introduction to Data Collection Systems</a:t>
+            </a:r>
+            <a:r>
+              <a:rPr b="1" i="0" lang="en" sz="2600" u="none" cap="none" strike="noStrike">
+                <a:solidFill>
+                  <a:srgbClr val="F2F2F2"/>
+                </a:solidFill>
+                <a:latin typeface="Open Sans"/>
+                <a:ea typeface="Open Sans"/>
+                <a:cs typeface="Open Sans"/>
+                <a:sym typeface="Open Sans"/>
+              </a:rPr>
+              <a:t> </a:t>
+            </a:r>
+            <a:endParaRPr b="0" i="0" sz="1100" u="none" cap="none" strike="noStrike">
+              <a:solidFill>
+                <a:srgbClr val="000000"/>
+              </a:solidFill>
+              <a:latin typeface="Arial"/>
+              <a:ea typeface="Arial"/>
+              <a:cs typeface="Arial"/>
+              <a:sym typeface="Arial"/>
+            </a:endParaRPr>
+          </a:p>
+        </p:txBody>
+      </p:sp>
+      <p:sp>
+        <p:nvSpPr>
+          <p:cNvPr id="114" name="Google Shape;114;p17"/>
+          <p:cNvSpPr/>
+          <p:nvPr/>
+        </p:nvSpPr>
+        <p:spPr>
+          <a:xfrm>
+            <a:off x="313771" y="843754"/>
+            <a:ext cx="2789700" cy="34200"/>
+          </a:xfrm>
+          <a:prstGeom prst="rect">
+            <a:avLst/>
+          </a:prstGeom>
+          <a:solidFill>
+            <a:srgbClr val="DE6E22"/>
+          </a:solidFill>
+          <a:ln>
+            <a:noFill/>
+          </a:ln>
+        </p:spPr>
+        <p:txBody>
+          <a:bodyPr anchorCtr="0" anchor="ctr" bIns="34275" lIns="34275" spcFirstLastPara="1" rIns="34275" wrap="square" tIns="34275">
+            <a:noAutofit/>
+          </a:bodyPr>
+          <a:lstStyle/>
+          <a:p>
+            <a:pPr indent="0" lvl="0" marL="0" marR="0" rtl="0" algn="ctr">
+              <a:lnSpc>
+                <a:spcPct val="100000"/>
+              </a:lnSpc>
+              <a:spcBef>
+                <a:spcPts val="0"/>
+              </a:spcBef>
+              <a:spcAft>
+                <a:spcPts val="0"/>
+              </a:spcAft>
+              <a:buClr>
+                <a:srgbClr val="FFFFFF"/>
+              </a:buClr>
+              <a:buSzPts val="1400"/>
+              <a:buFont typeface="Calibri"/>
+              <a:buNone/>
+            </a:pPr>
+            <a:r>
+              <a:t/>
+            </a:r>
+            <a:endParaRPr b="0" i="0" sz="1400" u="none" cap="none" strike="noStrike">
+              <a:solidFill>
+                <a:srgbClr val="FFFFFF"/>
+              </a:solidFill>
+              <a:latin typeface="Calibri"/>
+              <a:ea typeface="Calibri"/>
+              <a:cs typeface="Calibri"/>
+              <a:sym typeface="Calibri"/>
+            </a:endParaRPr>
+          </a:p>
+        </p:txBody>
+      </p:sp>
+      <p:sp>
+        <p:nvSpPr>
+          <p:cNvPr id="115" name="Google Shape;115;p17"/>
+          <p:cNvSpPr/>
+          <p:nvPr/>
+        </p:nvSpPr>
+        <p:spPr>
+          <a:xfrm>
+            <a:off x="228600" y="952975"/>
+            <a:ext cx="8724600" cy="335100"/>
+          </a:xfrm>
+          <a:prstGeom prst="rect">
+            <a:avLst/>
+          </a:prstGeom>
+          <a:noFill/>
+          <a:ln>
+            <a:noFill/>
+          </a:ln>
+        </p:spPr>
+        <p:txBody>
+          <a:bodyPr anchorCtr="0" anchor="t" bIns="34275" lIns="34275" spcFirstLastPara="1" rIns="34275" wrap="square" tIns="34275">
+            <a:noAutofit/>
+          </a:bodyPr>
+          <a:lstStyle/>
+          <a:p>
+            <a:pPr indent="0" lvl="0" marL="0" marR="0" rtl="0" algn="l">
+              <a:lnSpc>
+                <a:spcPct val="100000"/>
+              </a:lnSpc>
+              <a:spcBef>
+                <a:spcPts val="0"/>
+              </a:spcBef>
+              <a:spcAft>
+                <a:spcPts val="0"/>
+              </a:spcAft>
+              <a:buClr>
+                <a:srgbClr val="D9D9D9"/>
+              </a:buClr>
+              <a:buSzPts val="1700"/>
+              <a:buFont typeface="Open Sans"/>
+              <a:buNone/>
+            </a:pPr>
+            <a:r>
+              <a:rPr b="0" i="0" lang="en" sz="1700" u="none" cap="none" strike="noStrike">
+                <a:solidFill>
+                  <a:srgbClr val="D9D9D9"/>
+                </a:solidFill>
+                <a:latin typeface="Open Sans"/>
+                <a:ea typeface="Open Sans"/>
+                <a:cs typeface="Open Sans"/>
+                <a:sym typeface="Open Sans"/>
+              </a:rPr>
+              <a:t>Introduction -</a:t>
+            </a:r>
+            <a:r>
+              <a:rPr lang="en" sz="1700">
+                <a:solidFill>
+                  <a:srgbClr val="D9D9D9"/>
+                </a:solidFill>
+                <a:latin typeface="Open Sans"/>
+                <a:ea typeface="Open Sans"/>
+                <a:cs typeface="Open Sans"/>
+                <a:sym typeface="Open Sans"/>
+              </a:rPr>
+              <a:t> </a:t>
+            </a:r>
+            <a:r>
+              <a:rPr lang="en" sz="1100">
+                <a:solidFill>
+                  <a:srgbClr val="D9D9D9"/>
+                </a:solidFill>
+                <a:latin typeface="Open Sans"/>
+                <a:ea typeface="Open Sans"/>
+                <a:cs typeface="Open Sans"/>
+                <a:sym typeface="Open Sans"/>
+              </a:rPr>
+              <a:t>Select a collection system that addresses the key properties of data, such as order, format, and compression</a:t>
+            </a:r>
+            <a:endParaRPr b="0" i="0" sz="900" u="none" cap="none" strike="noStrike">
+              <a:solidFill>
+                <a:srgbClr val="000000"/>
+              </a:solidFill>
+              <a:latin typeface="Arial"/>
+              <a:ea typeface="Arial"/>
+              <a:cs typeface="Arial"/>
+              <a:sym typeface="Arial"/>
+            </a:endParaRPr>
+          </a:p>
+        </p:txBody>
+      </p:sp>
+      <p:pic>
+        <p:nvPicPr>
+          <p:cNvPr id="116" name="Google Shape;116;p17"/>
+          <p:cNvPicPr preferRelativeResize="0"/>
+          <p:nvPr/>
+        </p:nvPicPr>
+        <p:blipFill rotWithShape="1">
+          <a:blip r:embed="rId3">
+            <a:alphaModFix/>
+          </a:blip>
+          <a:srcRect b="0" l="0" r="0" t="0"/>
+          <a:stretch/>
+        </p:blipFill>
+        <p:spPr>
+          <a:xfrm>
+            <a:off x="8325525" y="4593059"/>
+            <a:ext cx="752475" cy="495300"/>
+          </a:xfrm>
+          <a:prstGeom prst="rect">
+            <a:avLst/>
+          </a:prstGeom>
+          <a:noFill/>
+          <a:ln>
+            <a:noFill/>
+          </a:ln>
+        </p:spPr>
+      </p:pic>
+      <p:sp>
+        <p:nvSpPr>
+          <p:cNvPr id="117" name="Google Shape;117;p17"/>
+          <p:cNvSpPr txBox="1"/>
+          <p:nvPr/>
+        </p:nvSpPr>
+        <p:spPr>
+          <a:xfrm>
+            <a:off x="708850" y="1584675"/>
+            <a:ext cx="8124000" cy="335100"/>
+          </a:xfrm>
+          <a:prstGeom prst="rect">
+            <a:avLst/>
+          </a:prstGeom>
+          <a:noFill/>
+          <a:ln>
+            <a:noFill/>
+          </a:ln>
+        </p:spPr>
+        <p:txBody>
+          <a:bodyPr anchorCtr="0" anchor="t" bIns="91425" lIns="91425" spcFirstLastPara="1" rIns="91425" wrap="square" tIns="91425">
+            <a:noAutofit/>
+          </a:bodyPr>
+          <a:lstStyle/>
+          <a:p>
+            <a:pPr indent="-317500" lvl="0" marL="457200" marR="0" rtl="0" algn="l">
+              <a:lnSpc>
+                <a:spcPct val="100000"/>
+              </a:lnSpc>
+              <a:spcBef>
+                <a:spcPts val="0"/>
+              </a:spcBef>
+              <a:spcAft>
+                <a:spcPts val="0"/>
+              </a:spcAft>
+              <a:buClr>
+                <a:srgbClr val="000000"/>
+              </a:buClr>
+              <a:buSzPts val="1400"/>
+              <a:buFont typeface="Arial"/>
+              <a:buChar char="❏"/>
+            </a:pPr>
+            <a:r>
+              <a:rPr lang="en"/>
+              <a:t>Select a collection system that addresses the key properties of data, such as order, format, and compression</a:t>
+            </a:r>
+            <a:endParaRPr b="0" i="0" sz="1400" u="none" cap="none" strike="noStrike">
+              <a:solidFill>
+                <a:srgbClr val="000000"/>
+              </a:solidFill>
+              <a:latin typeface="Arial"/>
+              <a:ea typeface="Arial"/>
+              <a:cs typeface="Arial"/>
+              <a:sym typeface="Arial"/>
+            </a:endParaRPr>
+          </a:p>
+        </p:txBody>
+      </p:sp>
+      <p:sp>
+        <p:nvSpPr>
+          <p:cNvPr id="118" name="Google Shape;118;p17"/>
+          <p:cNvSpPr txBox="1"/>
+          <p:nvPr/>
+        </p:nvSpPr>
+        <p:spPr>
+          <a:xfrm>
+            <a:off x="1013650" y="2194275"/>
+            <a:ext cx="6743100" cy="335100"/>
+          </a:xfrm>
+          <a:prstGeom prst="rect">
+            <a:avLst/>
+          </a:prstGeom>
+          <a:noFill/>
+          <a:ln>
+            <a:noFill/>
+          </a:ln>
+        </p:spPr>
+        <p:txBody>
+          <a:bodyPr anchorCtr="0" anchor="t" bIns="91425" lIns="91425" spcFirstLastPara="1" rIns="91425" wrap="square" tIns="91425">
+            <a:noAutofit/>
+          </a:bodyPr>
+          <a:lstStyle/>
+          <a:p>
+            <a:pPr indent="-317500" lvl="0" marL="457200" marR="0" rtl="0" algn="l">
+              <a:lnSpc>
+                <a:spcPct val="100000"/>
+              </a:lnSpc>
+              <a:spcBef>
+                <a:spcPts val="0"/>
+              </a:spcBef>
+              <a:spcAft>
+                <a:spcPts val="0"/>
+              </a:spcAft>
+              <a:buClr>
+                <a:srgbClr val="000000"/>
+              </a:buClr>
+              <a:buSzPts val="1400"/>
+              <a:buFont typeface="Arial"/>
+              <a:buChar char="❏"/>
+            </a:pPr>
+            <a:r>
+              <a:rPr lang="en"/>
+              <a:t>Order and duplication</a:t>
+            </a:r>
+            <a:endParaRPr b="0" i="0" sz="1400" u="none" cap="none" strike="noStrike">
+              <a:solidFill>
+                <a:srgbClr val="000000"/>
+              </a:solidFill>
+              <a:latin typeface="Arial"/>
+              <a:ea typeface="Arial"/>
+              <a:cs typeface="Arial"/>
+              <a:sym typeface="Arial"/>
+            </a:endParaRPr>
+          </a:p>
+        </p:txBody>
+      </p:sp>
+      <p:sp>
+        <p:nvSpPr>
+          <p:cNvPr id="119" name="Google Shape;119;p17"/>
+          <p:cNvSpPr txBox="1"/>
+          <p:nvPr/>
+        </p:nvSpPr>
+        <p:spPr>
+          <a:xfrm>
+            <a:off x="1013650" y="3565875"/>
+            <a:ext cx="6743100" cy="335100"/>
+          </a:xfrm>
+          <a:prstGeom prst="rect">
+            <a:avLst/>
+          </a:prstGeom>
+          <a:noFill/>
+          <a:ln>
+            <a:noFill/>
+          </a:ln>
+        </p:spPr>
+        <p:txBody>
+          <a:bodyPr anchorCtr="0" anchor="t" bIns="91425" lIns="91425" spcFirstLastPara="1" rIns="91425" wrap="square" tIns="91425">
+            <a:noAutofit/>
+          </a:bodyPr>
+          <a:lstStyle/>
+          <a:p>
+            <a:pPr indent="-317500" lvl="0" marL="457200" marR="0" rtl="0" algn="l">
+              <a:lnSpc>
+                <a:spcPct val="100000"/>
+              </a:lnSpc>
+              <a:spcBef>
+                <a:spcPts val="0"/>
+              </a:spcBef>
+              <a:spcAft>
+                <a:spcPts val="0"/>
+              </a:spcAft>
+              <a:buClr>
+                <a:srgbClr val="000000"/>
+              </a:buClr>
+              <a:buSzPts val="1400"/>
+              <a:buFont typeface="Arial"/>
+              <a:buChar char="❏"/>
+            </a:pPr>
+            <a:r>
+              <a:rPr lang="en"/>
+              <a:t>Transformation and filtering</a:t>
+            </a:r>
+            <a:endParaRPr b="0" i="0" sz="1400" u="none" cap="none" strike="noStrike">
+              <a:solidFill>
+                <a:srgbClr val="000000"/>
+              </a:solidFill>
+              <a:latin typeface="Arial"/>
+              <a:ea typeface="Arial"/>
+              <a:cs typeface="Arial"/>
+              <a:sym typeface="Arial"/>
+            </a:endParaRPr>
+          </a:p>
+        </p:txBody>
+      </p:sp>
+      <p:pic>
+        <p:nvPicPr>
+          <p:cNvPr id="120" name="Google Shape;120;p17">
+            <a:hlinkClick r:id="rId4"/>
+          </p:cNvPr>
+          <p:cNvPicPr preferRelativeResize="0"/>
+          <p:nvPr/>
+        </p:nvPicPr>
+        <p:blipFill>
+          <a:blip r:embed="rId5">
+            <a:alphaModFix/>
+          </a:blip>
+          <a:stretch>
+            <a:fillRect/>
+          </a:stretch>
+        </p:blipFill>
+        <p:spPr>
+          <a:xfrm>
+            <a:off x="3617075" y="2259528"/>
+            <a:ext cx="3671664" cy="1322325"/>
+          </a:xfrm>
+          <a:prstGeom prst="rect">
+            <a:avLst/>
+          </a:prstGeom>
+          <a:noFill/>
+          <a:ln>
+            <a:noFill/>
+          </a:ln>
+        </p:spPr>
+      </p:pic>
+      <p:pic>
+        <p:nvPicPr>
+          <p:cNvPr id="121" name="Google Shape;121;p17">
+            <a:hlinkClick r:id="rId6"/>
+          </p:cNvPr>
+          <p:cNvPicPr preferRelativeResize="0"/>
+          <p:nvPr/>
+        </p:nvPicPr>
+        <p:blipFill>
+          <a:blip r:embed="rId7">
+            <a:alphaModFix/>
+          </a:blip>
+          <a:stretch>
+            <a:fillRect/>
+          </a:stretch>
+        </p:blipFill>
+        <p:spPr>
+          <a:xfrm>
+            <a:off x="3984481" y="3809050"/>
+            <a:ext cx="2834747" cy="1187374"/>
+          </a:xfrm>
+          <a:prstGeom prst="rect">
+            <a:avLst/>
+          </a:prstGeom>
+          <a:noFill/>
+          <a:ln>
+            <a:noFill/>
+          </a:ln>
+        </p:spPr>
+      </p:pic>
+    </p:spTree>
+  </p:cSld>
+  <p:clrMapOvr>
+    <a:masterClrMapping/>
+  </p:clrMapOvr>
+  <p:timing>
+    <p:tnLst>
+      <p:par>
+        <p:cTn dur="indefinite" nodeType="tmRoot" restart="never">
+          <p:childTnLst>
+            <p:seq concurrent="1" nextAc="seek">
+              <p:cTn dur="indefinite" id="2" nodeType="mainSeq">
+                <p:childTnLst>
+                  <p:par>
+                    <p:cTn fill="hold">
+                      <p:stCondLst>
+                        <p:cond delay="indefinite"/>
+                      </p:stCondLst>
+                      <p:childTnLst>
+                        <p:par>
+                          <p:cTn fill="hold">
+                            <p:stCondLst>
+                              <p:cond delay="0"/>
+                            </p:stCondLst>
+                            <p:childTnLst>
+                              <p:par>
+                                <p:cTn fill="hold" nodeType="clickEffect" presetClass="entr" presetID="10" presetSubtype="0">
+                                  <p:stCondLst>
+                                    <p:cond delay="0"/>
+                                  </p:stCondLst>
+                                  <p:childTnLst>
+                                    <p:set>
+                                      <p:cBhvr>
+                                        <p:cTn dur="1" fill="hold">
+                                          <p:stCondLst>
+                                            <p:cond delay="0"/>
+                                          </p:stCondLst>
+                                        </p:cTn>
+                                        <p:tgtEl>
+                                          <p:spTgt spid="117"/>
+                                        </p:tgtEl>
+                                        <p:attrNameLst>
+                                          <p:attrName>style.visibility</p:attrName>
+                                        </p:attrNameLst>
+                                      </p:cBhvr>
+                                      <p:to>
+                                        <p:strVal val="visible"/>
+                                      </p:to>
+                                    </p:set>
+                                    <p:animEffect filter="fade" transition="in">
+                                      <p:cBhvr>
+                                        <p:cTn dur="1000"/>
+                                        <p:tgtEl>
+                                          <p:spTgt spid="117"/>
+                                        </p:tgtEl>
+                                      </p:cBhvr>
+                                    </p:animEffect>
+                                  </p:childTnLst>
+                                </p:cTn>
+                              </p:par>
+                            </p:childTnLst>
+                          </p:cTn>
+                        </p:par>
+                      </p:childTnLst>
+                    </p:cTn>
+                  </p:par>
+                  <p:par>
+                    <p:cTn fill="hold">
+                      <p:stCondLst>
+                        <p:cond delay="indefinite"/>
+                      </p:stCondLst>
+                      <p:childTnLst>
+                        <p:par>
+                          <p:cTn fill="hold">
+                            <p:stCondLst>
+                              <p:cond delay="0"/>
+                            </p:stCondLst>
+                            <p:childTnLst>
+                              <p:par>
+                                <p:cTn fill="hold" nodeType="clickEffect" presetClass="entr" presetID="10" presetSubtype="0">
+                                  <p:stCondLst>
+                                    <p:cond delay="0"/>
+                                  </p:stCondLst>
+                                  <p:childTnLst>
+                                    <p:set>
+                                      <p:cBhvr>
+                                        <p:cTn dur="1" fill="hold">
+                                          <p:stCondLst>
+                                            <p:cond delay="0"/>
+                                          </p:stCondLst>
+                                        </p:cTn>
+                                        <p:tgtEl>
+                                          <p:spTgt spid="118"/>
+                                        </p:tgtEl>
+                                        <p:attrNameLst>
+                                          <p:attrName>style.visibility</p:attrName>
+                                        </p:attrNameLst>
+                                      </p:cBhvr>
+                                      <p:to>
+                                        <p:strVal val="visible"/>
+                                      </p:to>
+                                    </p:set>
+                                    <p:animEffect filter="fade" transition="in">
+                                      <p:cBhvr>
+                                        <p:cTn dur="1000"/>
+                                        <p:tgtEl>
+                                          <p:spTgt spid="118"/>
+                                        </p:tgtEl>
+                                      </p:cBhvr>
+                                    </p:animEffect>
+                                  </p:childTnLst>
+                                </p:cTn>
+                              </p:par>
+                              <p:par>
+                                <p:cTn fill="hold" nodeType="withEffect" presetClass="entr" presetID="10" presetSubtype="0">
+                                  <p:stCondLst>
+                                    <p:cond delay="0"/>
+                                  </p:stCondLst>
+                                  <p:childTnLst>
+                                    <p:set>
+                                      <p:cBhvr>
+                                        <p:cTn dur="1" fill="hold">
+                                          <p:stCondLst>
+                                            <p:cond delay="0"/>
+                                          </p:stCondLst>
+                                        </p:cTn>
+                                        <p:tgtEl>
+                                          <p:spTgt spid="120"/>
+                                        </p:tgtEl>
+                                        <p:attrNameLst>
+                                          <p:attrName>style.visibility</p:attrName>
+                                        </p:attrNameLst>
+                                      </p:cBhvr>
+                                      <p:to>
+                                        <p:strVal val="visible"/>
+                                      </p:to>
+                                    </p:set>
+                                    <p:animEffect filter="fade" transition="in">
+                                      <p:cBhvr>
+                                        <p:cTn dur="1000"/>
+                                        <p:tgtEl>
+                                          <p:spTgt spid="120"/>
+                                        </p:tgtEl>
+                                      </p:cBhvr>
+                                    </p:animEffect>
+                                  </p:childTnLst>
+                                </p:cTn>
+                              </p:par>
+                            </p:childTnLst>
+                          </p:cTn>
+                        </p:par>
+                      </p:childTnLst>
+                    </p:cTn>
+                  </p:par>
+                  <p:par>
+                    <p:cTn fill="hold">
+                      <p:stCondLst>
+                        <p:cond delay="indefinite"/>
+                      </p:stCondLst>
+                      <p:childTnLst>
+                        <p:par>
+                          <p:cTn fill="hold">
+                            <p:stCondLst>
+                              <p:cond delay="0"/>
+                            </p:stCondLst>
+                            <p:childTnLst>
+                              <p:par>
+                                <p:cTn fill="hold" nodeType="clickEffect" presetClass="entr" presetID="10" presetSubtype="0">
+                                  <p:stCondLst>
+                                    <p:cond delay="0"/>
+                                  </p:stCondLst>
+                                  <p:childTnLst>
+                                    <p:set>
+                                      <p:cBhvr>
+                                        <p:cTn dur="1" fill="hold">
+                                          <p:stCondLst>
+                                            <p:cond delay="0"/>
+                                          </p:stCondLst>
+                                        </p:cTn>
+                                        <p:tgtEl>
+                                          <p:spTgt spid="119"/>
+                                        </p:tgtEl>
+                                        <p:attrNameLst>
+                                          <p:attrName>style.visibility</p:attrName>
+                                        </p:attrNameLst>
+                                      </p:cBhvr>
+                                      <p:to>
+                                        <p:strVal val="visible"/>
+                                      </p:to>
+                                    </p:set>
+                                    <p:animEffect filter="fade" transition="in">
+                                      <p:cBhvr>
+                                        <p:cTn dur="1000"/>
+                                        <p:tgtEl>
+                                          <p:spTgt spid="119"/>
+                                        </p:tgtEl>
+                                      </p:cBhvr>
+                                    </p:animEffect>
+                                  </p:childTnLst>
+                                </p:cTn>
+                              </p:par>
+                              <p:par>
+                                <p:cTn fill="hold" nodeType="withEffect" presetClass="entr" presetID="10" presetSubtype="0">
+                                  <p:stCondLst>
+                                    <p:cond delay="0"/>
+                                  </p:stCondLst>
+                                  <p:childTnLst>
+                                    <p:set>
+                                      <p:cBhvr>
+                                        <p:cTn dur="1" fill="hold">
+                                          <p:stCondLst>
+                                            <p:cond delay="0"/>
+                                          </p:stCondLst>
+                                        </p:cTn>
+                                        <p:tgtEl>
+                                          <p:spTgt spid="121"/>
+                                        </p:tgtEl>
+                                        <p:attrNameLst>
+                                          <p:attrName>style.visibility</p:attrName>
+                                        </p:attrNameLst>
+                                      </p:cBhvr>
+                                      <p:to>
+                                        <p:strVal val="visible"/>
+                                      </p:to>
+                                    </p:set>
+                                    <p:animEffect filter="fade" transition="in">
+                                      <p:cBhvr>
+                                        <p:cTn dur="1000"/>
+                                        <p:tgtEl>
+                                          <p:spTgt spid="121"/>
+                                        </p:tgtEl>
+                                      </p:cBhvr>
+                                    </p:animEffect>
+                                  </p:childTnLst>
+                                </p:cTn>
+                              </p:par>
+                            </p:childTnLst>
+                          </p:cTn>
+                        </p:par>
+                      </p:childTnLst>
+                    </p:cTn>
+                  </p:par>
+                </p:childTnLst>
+              </p:cTn>
+              <p:prevCondLst>
+                <p:cond evt="onPrev">
+                  <p:tgtEl>
+                    <p:sldTgt/>
+                  </p:tgtEl>
+                </p:cond>
+              </p:prevCondLst>
+              <p:nextCondLst>
+                <p:cond evt="onNext">
+                  <p:tgtEl>
+                    <p:sldTgt/>
+                  </p:tgtEl>
+                </p:cond>
+              </p:nextCondLst>
+            </p:seq>
+          </p:childTnLst>
+        </p:cTn>
+      </p:par>
+    </p:tnLst>
+  </p:timing>
+</p:sld>
+</file>
+
+<file path=ppt/slides/slide6.xml><?xml version="1.0" encoding="utf-8"?>
+<p:sld xmlns:a="http://schemas.openxmlformats.org/drawingml/2006/main" xmlns:r="http://schemas.openxmlformats.org/officeDocument/2006/relationships" xmlns:mc="http://schemas.openxmlformats.org/markup-compatibility/2006" xmlns:mv="urn:schemas-microsoft-com:mac:vml" xmlns:p="http://schemas.openxmlformats.org/presentationml/2006/main" xmlns:c="http://schemas.openxmlformats.org/drawingml/2006/chart" xmlns:dgm="http://schemas.openxmlformats.org/drawingml/2006/diagram" xmlns:o="urn:schemas-microsoft-com:office:office" xmlns:v="urn:schemas-microsoft-com:vml" xmlns:pvml="urn:schemas-microsoft-com:office:powerpoint" xmlns:com="http://schemas.openxmlformats.org/drawingml/2006/compatibility" xmlns:p14="http://schemas.microsoft.com/office/powerpoint/2010/main" xmlns:p15="http://schemas.microsoft.com/office/powerpoint/2012/main">
+  <p:cSld>
+    <p:spTree>
+      <p:nvGrpSpPr>
+        <p:cNvPr id="125" name="Shape 125"/>
+        <p:cNvGrpSpPr/>
+        <p:nvPr/>
+      </p:nvGrpSpPr>
+      <p:grpSpPr>
+        <a:xfrm>
+          <a:off x="0" y="0"/>
+          <a:ext cx="0" cy="0"/>
+          <a:chOff x="0" y="0"/>
+          <a:chExt cx="0" cy="0"/>
+        </a:xfrm>
+      </p:grpSpPr>
+      <p:sp>
+        <p:nvSpPr>
+          <p:cNvPr id="126" name="Google Shape;126;p18"/>
+          <p:cNvSpPr/>
+          <p:nvPr/>
+        </p:nvSpPr>
+        <p:spPr>
+          <a:xfrm>
+            <a:off x="-179682" y="-308191"/>
+            <a:ext cx="9647400" cy="1688700"/>
+          </a:xfrm>
+          <a:prstGeom prst="rect">
+            <a:avLst/>
+          </a:prstGeom>
+          <a:solidFill>
+            <a:srgbClr val="002645"/>
+          </a:solidFill>
+          <a:ln>
+            <a:noFill/>
+          </a:ln>
+          <a:effectLst>
+            <a:outerShdw blurRad="50800" rotWithShape="0" dir="5400000" dist="38100">
+              <a:srgbClr val="000000">
+                <a:alpha val="40000"/>
+              </a:srgbClr>
+            </a:outerShdw>
+          </a:effectLst>
+        </p:spPr>
+        <p:txBody>
+          <a:bodyPr anchorCtr="0" anchor="ctr" bIns="34275" lIns="34275" spcFirstLastPara="1" rIns="34275" wrap="square" tIns="34275">
+            <a:noAutofit/>
+          </a:bodyPr>
+          <a:lstStyle/>
+          <a:p>
+            <a:pPr indent="0" lvl="0" marL="0" marR="0" rtl="0" algn="ctr">
+              <a:lnSpc>
+                <a:spcPct val="100000"/>
+              </a:lnSpc>
+              <a:spcBef>
+                <a:spcPts val="0"/>
+              </a:spcBef>
+              <a:spcAft>
+                <a:spcPts val="0"/>
+              </a:spcAft>
+              <a:buClr>
+                <a:srgbClr val="FFFFFF"/>
+              </a:buClr>
+              <a:buSzPts val="1400"/>
+              <a:buFont typeface="Calibri"/>
+              <a:buNone/>
+            </a:pPr>
+            <a:r>
+              <a:t/>
+            </a:r>
+            <a:endParaRPr b="0" i="0" sz="1400" u="none" cap="none" strike="noStrike">
+              <a:solidFill>
+                <a:srgbClr val="FFFFFF"/>
+              </a:solidFill>
+              <a:latin typeface="Calibri"/>
+              <a:ea typeface="Calibri"/>
+              <a:cs typeface="Calibri"/>
+              <a:sym typeface="Calibri"/>
+            </a:endParaRPr>
+          </a:p>
+        </p:txBody>
+      </p:sp>
+      <p:sp>
+        <p:nvSpPr>
+          <p:cNvPr id="127" name="Google Shape;127;p18"/>
+          <p:cNvSpPr/>
+          <p:nvPr/>
+        </p:nvSpPr>
+        <p:spPr>
+          <a:xfrm>
+            <a:off x="228600" y="331700"/>
+            <a:ext cx="8915400" cy="468600"/>
+          </a:xfrm>
+          <a:prstGeom prst="rect">
+            <a:avLst/>
+          </a:prstGeom>
+          <a:noFill/>
+          <a:ln>
+            <a:noFill/>
+          </a:ln>
+        </p:spPr>
+        <p:txBody>
+          <a:bodyPr anchorCtr="0" anchor="t" bIns="34275" lIns="34275" spcFirstLastPara="1" rIns="34275" wrap="square" tIns="34275">
+            <a:noAutofit/>
+          </a:bodyPr>
+          <a:lstStyle/>
+          <a:p>
+            <a:pPr indent="0" lvl="0" marL="0" marR="0" rtl="0" algn="l">
+              <a:lnSpc>
+                <a:spcPct val="100000"/>
+              </a:lnSpc>
+              <a:spcBef>
+                <a:spcPts val="0"/>
+              </a:spcBef>
+              <a:spcAft>
+                <a:spcPts val="0"/>
+              </a:spcAft>
+              <a:buClr>
+                <a:srgbClr val="F2F2F2"/>
+              </a:buClr>
+              <a:buSzPts val="2600"/>
+              <a:buFont typeface="Open Sans"/>
+              <a:buNone/>
+            </a:pPr>
+            <a:r>
+              <a:rPr b="1" i="0" lang="en" sz="2600" u="none" cap="none" strike="noStrike">
+                <a:solidFill>
+                  <a:srgbClr val="F2F2F2"/>
+                </a:solidFill>
+                <a:latin typeface="Open Sans"/>
+                <a:ea typeface="Open Sans"/>
+                <a:cs typeface="Open Sans"/>
+                <a:sym typeface="Open Sans"/>
+              </a:rPr>
+              <a:t>AWS </a:t>
+            </a:r>
+            <a:r>
+              <a:rPr b="1" lang="en" sz="2600">
+                <a:solidFill>
+                  <a:srgbClr val="F2F2F2"/>
+                </a:solidFill>
+                <a:latin typeface="Open Sans"/>
+                <a:ea typeface="Open Sans"/>
+                <a:cs typeface="Open Sans"/>
+                <a:sym typeface="Open Sans"/>
+              </a:rPr>
+              <a:t>Data Analytics</a:t>
+            </a:r>
+            <a:r>
+              <a:rPr b="1" i="0" lang="en" sz="2600" u="none" cap="none" strike="noStrike">
+                <a:solidFill>
+                  <a:srgbClr val="F2F2F2"/>
+                </a:solidFill>
+                <a:latin typeface="Open Sans"/>
+                <a:ea typeface="Open Sans"/>
+                <a:cs typeface="Open Sans"/>
+                <a:sym typeface="Open Sans"/>
+              </a:rPr>
+              <a:t> - </a:t>
+            </a:r>
+            <a:r>
+              <a:rPr b="1" lang="en" sz="2100">
+                <a:solidFill>
+                  <a:srgbClr val="F2F2F2"/>
+                </a:solidFill>
+                <a:latin typeface="Open Sans"/>
+                <a:ea typeface="Open Sans"/>
+                <a:cs typeface="Open Sans"/>
+                <a:sym typeface="Open Sans"/>
+              </a:rPr>
+              <a:t>Introduction to Data Collection Systems</a:t>
+            </a:r>
+            <a:r>
+              <a:rPr b="1" i="0" lang="en" sz="2600" u="none" cap="none" strike="noStrike">
+                <a:solidFill>
+                  <a:srgbClr val="F2F2F2"/>
+                </a:solidFill>
+                <a:latin typeface="Open Sans"/>
+                <a:ea typeface="Open Sans"/>
+                <a:cs typeface="Open Sans"/>
+                <a:sym typeface="Open Sans"/>
+              </a:rPr>
+              <a:t> </a:t>
+            </a:r>
+            <a:endParaRPr b="0" i="0" sz="1100" u="none" cap="none" strike="noStrike">
+              <a:solidFill>
+                <a:srgbClr val="000000"/>
+              </a:solidFill>
+              <a:latin typeface="Arial"/>
+              <a:ea typeface="Arial"/>
+              <a:cs typeface="Arial"/>
+              <a:sym typeface="Arial"/>
+            </a:endParaRPr>
+          </a:p>
+        </p:txBody>
+      </p:sp>
+      <p:sp>
+        <p:nvSpPr>
+          <p:cNvPr id="128" name="Google Shape;128;p18"/>
+          <p:cNvSpPr/>
+          <p:nvPr/>
+        </p:nvSpPr>
+        <p:spPr>
+          <a:xfrm>
+            <a:off x="313771" y="843754"/>
+            <a:ext cx="2789700" cy="34200"/>
+          </a:xfrm>
+          <a:prstGeom prst="rect">
+            <a:avLst/>
+          </a:prstGeom>
+          <a:solidFill>
+            <a:srgbClr val="DE6E22"/>
+          </a:solidFill>
+          <a:ln>
+            <a:noFill/>
+          </a:ln>
+        </p:spPr>
+        <p:txBody>
+          <a:bodyPr anchorCtr="0" anchor="ctr" bIns="34275" lIns="34275" spcFirstLastPara="1" rIns="34275" wrap="square" tIns="34275">
+            <a:noAutofit/>
+          </a:bodyPr>
+          <a:lstStyle/>
+          <a:p>
+            <a:pPr indent="0" lvl="0" marL="0" marR="0" rtl="0" algn="ctr">
+              <a:lnSpc>
+                <a:spcPct val="100000"/>
+              </a:lnSpc>
+              <a:spcBef>
+                <a:spcPts val="0"/>
+              </a:spcBef>
+              <a:spcAft>
+                <a:spcPts val="0"/>
+              </a:spcAft>
+              <a:buClr>
+                <a:srgbClr val="FFFFFF"/>
+              </a:buClr>
+              <a:buSzPts val="1400"/>
+              <a:buFont typeface="Calibri"/>
+              <a:buNone/>
+            </a:pPr>
+            <a:r>
+              <a:t/>
+            </a:r>
+            <a:endParaRPr b="0" i="0" sz="1400" u="none" cap="none" strike="noStrike">
+              <a:solidFill>
+                <a:srgbClr val="FFFFFF"/>
+              </a:solidFill>
+              <a:latin typeface="Calibri"/>
+              <a:ea typeface="Calibri"/>
+              <a:cs typeface="Calibri"/>
+              <a:sym typeface="Calibri"/>
+            </a:endParaRPr>
+          </a:p>
+        </p:txBody>
+      </p:sp>
+      <p:sp>
+        <p:nvSpPr>
+          <p:cNvPr id="129" name="Google Shape;129;p18"/>
+          <p:cNvSpPr/>
+          <p:nvPr/>
+        </p:nvSpPr>
+        <p:spPr>
+          <a:xfrm>
+            <a:off x="228600" y="952975"/>
+            <a:ext cx="8724600" cy="335100"/>
+          </a:xfrm>
+          <a:prstGeom prst="rect">
+            <a:avLst/>
+          </a:prstGeom>
+          <a:noFill/>
+          <a:ln>
+            <a:noFill/>
+          </a:ln>
+        </p:spPr>
+        <p:txBody>
+          <a:bodyPr anchorCtr="0" anchor="t" bIns="34275" lIns="34275" spcFirstLastPara="1" rIns="34275" wrap="square" tIns="34275">
+            <a:noAutofit/>
+          </a:bodyPr>
+          <a:lstStyle/>
+          <a:p>
+            <a:pPr indent="0" lvl="0" marL="0" marR="0" rtl="0" algn="l">
+              <a:lnSpc>
+                <a:spcPct val="100000"/>
+              </a:lnSpc>
+              <a:spcBef>
+                <a:spcPts val="0"/>
+              </a:spcBef>
+              <a:spcAft>
+                <a:spcPts val="0"/>
+              </a:spcAft>
+              <a:buClr>
+                <a:srgbClr val="D9D9D9"/>
+              </a:buClr>
+              <a:buSzPts val="1700"/>
+              <a:buFont typeface="Open Sans"/>
+              <a:buNone/>
+            </a:pPr>
+            <a:r>
+              <a:rPr lang="en" sz="1700">
+                <a:solidFill>
+                  <a:srgbClr val="D9D9D9"/>
+                </a:solidFill>
+                <a:latin typeface="Open Sans"/>
+                <a:ea typeface="Open Sans"/>
+                <a:cs typeface="Open Sans"/>
+                <a:sym typeface="Open Sans"/>
+              </a:rPr>
+              <a:t>Summary</a:t>
+            </a:r>
+            <a:r>
+              <a:rPr b="0" i="0" lang="en" sz="1700" u="none" cap="none" strike="noStrike">
+                <a:solidFill>
+                  <a:srgbClr val="D9D9D9"/>
+                </a:solidFill>
+                <a:latin typeface="Open Sans"/>
+                <a:ea typeface="Open Sans"/>
+                <a:cs typeface="Open Sans"/>
+                <a:sym typeface="Open Sans"/>
+              </a:rPr>
+              <a:t> </a:t>
+            </a:r>
+            <a:endParaRPr b="0" i="0" sz="900" u="none" cap="none" strike="noStrike">
+              <a:solidFill>
+                <a:srgbClr val="000000"/>
+              </a:solidFill>
+              <a:latin typeface="Arial"/>
+              <a:ea typeface="Arial"/>
+              <a:cs typeface="Arial"/>
+              <a:sym typeface="Arial"/>
+            </a:endParaRPr>
+          </a:p>
+        </p:txBody>
+      </p:sp>
+      <p:pic>
+        <p:nvPicPr>
+          <p:cNvPr id="130" name="Google Shape;130;p18"/>
+          <p:cNvPicPr preferRelativeResize="0"/>
+          <p:nvPr/>
+        </p:nvPicPr>
+        <p:blipFill rotWithShape="1">
+          <a:blip r:embed="rId3">
+            <a:alphaModFix/>
+          </a:blip>
+          <a:srcRect b="0" l="0" r="0" t="0"/>
+          <a:stretch/>
+        </p:blipFill>
+        <p:spPr>
+          <a:xfrm>
+            <a:off x="8325525" y="4593059"/>
+            <a:ext cx="752475" cy="495300"/>
+          </a:xfrm>
+          <a:prstGeom prst="rect">
+            <a:avLst/>
+          </a:prstGeom>
+          <a:noFill/>
+          <a:ln>
+            <a:noFill/>
+          </a:ln>
+        </p:spPr>
+      </p:pic>
+      <p:sp>
+        <p:nvSpPr>
+          <p:cNvPr id="131" name="Google Shape;131;p18"/>
+          <p:cNvSpPr txBox="1"/>
+          <p:nvPr/>
+        </p:nvSpPr>
+        <p:spPr>
+          <a:xfrm>
+            <a:off x="708850" y="1584675"/>
+            <a:ext cx="8124000" cy="335100"/>
+          </a:xfrm>
+          <a:prstGeom prst="rect">
+            <a:avLst/>
+          </a:prstGeom>
+          <a:noFill/>
+          <a:ln>
+            <a:noFill/>
+          </a:ln>
+        </p:spPr>
+        <p:txBody>
+          <a:bodyPr anchorCtr="0" anchor="t" bIns="91425" lIns="91425" spcFirstLastPara="1" rIns="91425" wrap="square" tIns="91425">
+            <a:noAutofit/>
+          </a:bodyPr>
+          <a:lstStyle/>
+          <a:p>
+            <a:pPr indent="-317500" lvl="0" marL="457200" marR="0" rtl="0" algn="l">
+              <a:lnSpc>
+                <a:spcPct val="100000"/>
+              </a:lnSpc>
+              <a:spcBef>
+                <a:spcPts val="0"/>
+              </a:spcBef>
+              <a:spcAft>
+                <a:spcPts val="0"/>
+              </a:spcAft>
+              <a:buClr>
+                <a:srgbClr val="000000"/>
+              </a:buClr>
+              <a:buSzPts val="1400"/>
+              <a:buFont typeface="Arial"/>
+              <a:buChar char="❏"/>
+            </a:pPr>
+            <a:r>
+              <a:rPr lang="en"/>
+              <a:t>Data collection systems give you the capability to ingest any kind of data, structured, unstructured, or semi-structured</a:t>
+            </a:r>
+            <a:endParaRPr b="0" i="0" sz="1400" u="none" cap="none" strike="noStrike">
+              <a:solidFill>
+                <a:srgbClr val="000000"/>
+              </a:solidFill>
+              <a:latin typeface="Arial"/>
+              <a:ea typeface="Arial"/>
+              <a:cs typeface="Arial"/>
+              <a:sym typeface="Arial"/>
+            </a:endParaRPr>
+          </a:p>
+        </p:txBody>
+      </p:sp>
+      <p:sp>
+        <p:nvSpPr>
+          <p:cNvPr id="132" name="Google Shape;132;p18"/>
+          <p:cNvSpPr txBox="1"/>
+          <p:nvPr/>
+        </p:nvSpPr>
+        <p:spPr>
+          <a:xfrm>
+            <a:off x="708850" y="2194275"/>
+            <a:ext cx="6743100" cy="335100"/>
+          </a:xfrm>
+          <a:prstGeom prst="rect">
+            <a:avLst/>
+          </a:prstGeom>
+          <a:noFill/>
+          <a:ln>
+            <a:noFill/>
+          </a:ln>
+        </p:spPr>
+        <p:txBody>
+          <a:bodyPr anchorCtr="0" anchor="t" bIns="91425" lIns="91425" spcFirstLastPara="1" rIns="91425" wrap="square" tIns="91425">
+            <a:noAutofit/>
+          </a:bodyPr>
+          <a:lstStyle/>
+          <a:p>
+            <a:pPr indent="-317500" lvl="0" marL="457200" marR="0" rtl="0" algn="l">
+              <a:lnSpc>
+                <a:spcPct val="100000"/>
+              </a:lnSpc>
+              <a:spcBef>
+                <a:spcPts val="0"/>
+              </a:spcBef>
+              <a:spcAft>
+                <a:spcPts val="0"/>
+              </a:spcAft>
+              <a:buClr>
+                <a:srgbClr val="000000"/>
+              </a:buClr>
+              <a:buSzPts val="1400"/>
+              <a:buFont typeface="Arial"/>
+              <a:buChar char="❏"/>
+            </a:pPr>
+            <a:r>
+              <a:rPr lang="en"/>
+              <a:t>Can ingest using the appropriate frequency based on your situation</a:t>
+            </a:r>
+            <a:endParaRPr b="0" i="0" sz="1400" u="none" cap="none" strike="noStrike">
+              <a:solidFill>
+                <a:srgbClr val="000000"/>
+              </a:solidFill>
+              <a:latin typeface="Arial"/>
+              <a:ea typeface="Arial"/>
+              <a:cs typeface="Arial"/>
+              <a:sym typeface="Arial"/>
+            </a:endParaRPr>
+          </a:p>
+        </p:txBody>
+      </p:sp>
+      <p:sp>
+        <p:nvSpPr>
+          <p:cNvPr id="133" name="Google Shape;133;p18"/>
+          <p:cNvSpPr txBox="1"/>
+          <p:nvPr/>
+        </p:nvSpPr>
+        <p:spPr>
+          <a:xfrm>
+            <a:off x="1013650" y="2651475"/>
+            <a:ext cx="6743100" cy="335100"/>
+          </a:xfrm>
+          <a:prstGeom prst="rect">
+            <a:avLst/>
+          </a:prstGeom>
+          <a:noFill/>
+          <a:ln>
+            <a:noFill/>
+          </a:ln>
+        </p:spPr>
+        <p:txBody>
+          <a:bodyPr anchorCtr="0" anchor="t" bIns="91425" lIns="91425" spcFirstLastPara="1" rIns="91425" wrap="square" tIns="91425">
+            <a:noAutofit/>
+          </a:bodyPr>
+          <a:lstStyle/>
+          <a:p>
+            <a:pPr indent="-317500" lvl="0" marL="457200" marR="0" rtl="0" algn="l">
+              <a:lnSpc>
+                <a:spcPct val="100000"/>
+              </a:lnSpc>
+              <a:spcBef>
+                <a:spcPts val="0"/>
+              </a:spcBef>
+              <a:spcAft>
+                <a:spcPts val="0"/>
+              </a:spcAft>
+              <a:buClr>
+                <a:srgbClr val="000000"/>
+              </a:buClr>
+              <a:buSzPts val="1400"/>
+              <a:buFont typeface="Arial"/>
+              <a:buChar char="❏"/>
+            </a:pPr>
+            <a:r>
+              <a:rPr lang="en"/>
+              <a:t>Batch</a:t>
+            </a:r>
+            <a:endParaRPr b="0" i="0" sz="1400" u="none" cap="none" strike="noStrike">
+              <a:solidFill>
+                <a:srgbClr val="000000"/>
+              </a:solidFill>
+              <a:latin typeface="Arial"/>
+              <a:ea typeface="Arial"/>
+              <a:cs typeface="Arial"/>
+              <a:sym typeface="Arial"/>
+            </a:endParaRPr>
+          </a:p>
+        </p:txBody>
+      </p:sp>
+      <p:sp>
+        <p:nvSpPr>
+          <p:cNvPr id="134" name="Google Shape;134;p18"/>
+          <p:cNvSpPr txBox="1"/>
+          <p:nvPr/>
+        </p:nvSpPr>
+        <p:spPr>
+          <a:xfrm>
+            <a:off x="1013650" y="2986575"/>
+            <a:ext cx="6743100" cy="335100"/>
+          </a:xfrm>
+          <a:prstGeom prst="rect">
+            <a:avLst/>
+          </a:prstGeom>
+          <a:noFill/>
+          <a:ln>
+            <a:noFill/>
+          </a:ln>
+        </p:spPr>
+        <p:txBody>
+          <a:bodyPr anchorCtr="0" anchor="t" bIns="91425" lIns="91425" spcFirstLastPara="1" rIns="91425" wrap="square" tIns="91425">
+            <a:noAutofit/>
+          </a:bodyPr>
+          <a:lstStyle/>
+          <a:p>
+            <a:pPr indent="-317500" lvl="0" marL="457200" marR="0" rtl="0" algn="l">
+              <a:lnSpc>
+                <a:spcPct val="100000"/>
+              </a:lnSpc>
+              <a:spcBef>
+                <a:spcPts val="0"/>
+              </a:spcBef>
+              <a:spcAft>
+                <a:spcPts val="0"/>
+              </a:spcAft>
+              <a:buClr>
+                <a:srgbClr val="000000"/>
+              </a:buClr>
+              <a:buSzPts val="1400"/>
+              <a:buFont typeface="Arial"/>
+              <a:buChar char="❏"/>
+            </a:pPr>
+            <a:r>
+              <a:rPr lang="en"/>
+              <a:t>Streaming</a:t>
+            </a:r>
+            <a:endParaRPr b="0" i="0" sz="1400" u="none" cap="none" strike="noStrike">
+              <a:solidFill>
+                <a:srgbClr val="000000"/>
+              </a:solidFill>
+              <a:latin typeface="Arial"/>
+              <a:ea typeface="Arial"/>
+              <a:cs typeface="Arial"/>
+              <a:sym typeface="Arial"/>
+            </a:endParaRPr>
+          </a:p>
+        </p:txBody>
+      </p:sp>
+      <p:sp>
+        <p:nvSpPr>
+          <p:cNvPr id="135" name="Google Shape;135;p18"/>
+          <p:cNvSpPr txBox="1"/>
+          <p:nvPr/>
+        </p:nvSpPr>
+        <p:spPr>
+          <a:xfrm>
+            <a:off x="1013650" y="3367575"/>
+            <a:ext cx="6743100" cy="335100"/>
+          </a:xfrm>
+          <a:prstGeom prst="rect">
+            <a:avLst/>
+          </a:prstGeom>
+          <a:noFill/>
+          <a:ln>
+            <a:noFill/>
+          </a:ln>
+        </p:spPr>
+        <p:txBody>
+          <a:bodyPr anchorCtr="0" anchor="t" bIns="91425" lIns="91425" spcFirstLastPara="1" rIns="91425" wrap="square" tIns="91425">
+            <a:noAutofit/>
+          </a:bodyPr>
+          <a:lstStyle/>
+          <a:p>
+            <a:pPr indent="-317500" lvl="0" marL="457200" marR="0" rtl="0" algn="l">
+              <a:lnSpc>
+                <a:spcPct val="100000"/>
+              </a:lnSpc>
+              <a:spcBef>
+                <a:spcPts val="0"/>
+              </a:spcBef>
+              <a:spcAft>
+                <a:spcPts val="0"/>
+              </a:spcAft>
+              <a:buClr>
+                <a:srgbClr val="000000"/>
+              </a:buClr>
+              <a:buSzPts val="1400"/>
+              <a:buFont typeface="Arial"/>
+              <a:buChar char="❏"/>
+            </a:pPr>
+            <a:r>
+              <a:rPr lang="en"/>
+              <a:t>Transactional</a:t>
+            </a:r>
+            <a:endParaRPr b="0" i="0" sz="1400" u="none" cap="none" strike="noStrike">
+              <a:solidFill>
+                <a:srgbClr val="000000"/>
+              </a:solidFill>
+              <a:latin typeface="Arial"/>
+              <a:ea typeface="Arial"/>
+              <a:cs typeface="Arial"/>
+              <a:sym typeface="Arial"/>
+            </a:endParaRPr>
+          </a:p>
+        </p:txBody>
+      </p:sp>
+      <p:sp>
+        <p:nvSpPr>
+          <p:cNvPr id="136" name="Google Shape;136;p18"/>
+          <p:cNvSpPr txBox="1"/>
+          <p:nvPr/>
+        </p:nvSpPr>
+        <p:spPr>
+          <a:xfrm>
+            <a:off x="708850" y="3794475"/>
+            <a:ext cx="6743100" cy="335100"/>
+          </a:xfrm>
+          <a:prstGeom prst="rect">
+            <a:avLst/>
+          </a:prstGeom>
+          <a:noFill/>
+          <a:ln>
+            <a:noFill/>
+          </a:ln>
+        </p:spPr>
+        <p:txBody>
+          <a:bodyPr anchorCtr="0" anchor="t" bIns="91425" lIns="91425" spcFirstLastPara="1" rIns="91425" wrap="square" tIns="91425">
+            <a:noAutofit/>
+          </a:bodyPr>
+          <a:lstStyle/>
+          <a:p>
+            <a:pPr indent="-317500" lvl="0" marL="457200" marR="0" rtl="0" algn="l">
+              <a:lnSpc>
+                <a:spcPct val="100000"/>
+              </a:lnSpc>
+              <a:spcBef>
+                <a:spcPts val="0"/>
+              </a:spcBef>
+              <a:spcAft>
+                <a:spcPts val="0"/>
+              </a:spcAft>
+              <a:buClr>
+                <a:srgbClr val="000000"/>
+              </a:buClr>
+              <a:buSzPts val="1400"/>
+              <a:buFont typeface="Arial"/>
+              <a:buChar char="❏"/>
+            </a:pPr>
+            <a:r>
+              <a:rPr lang="en"/>
+              <a:t>Transform and/or filter your data as you collect it</a:t>
+            </a:r>
+            <a:endParaRPr b="0" i="0" sz="1400" u="none" cap="none" strike="noStrike">
+              <a:solidFill>
+                <a:srgbClr val="000000"/>
+              </a:solidFill>
+              <a:latin typeface="Arial"/>
+              <a:ea typeface="Arial"/>
+              <a:cs typeface="Arial"/>
+              <a:sym typeface="Arial"/>
+            </a:endParaRPr>
+          </a:p>
+        </p:txBody>
+      </p:sp>
+    </p:spTree>
+  </p:cSld>
+  <p:clrMapOvr>
+    <a:masterClrMapping/>
+  </p:clrMapOvr>
+  <p:timing>
+    <p:tnLst>
+      <p:par>
+        <p:cTn dur="indefinite" nodeType="tmRoot" restart="never">
+          <p:childTnLst>
+            <p:seq concurrent="1" nextAc="seek">
+              <p:cTn dur="indefinite" id="2" nodeType="mainSeq">
+                <p:childTnLst>
+                  <p:par>
+                    <p:cTn fill="hold">
+                      <p:stCondLst>
+                        <p:cond delay="indefinite"/>
+                      </p:stCondLst>
+                      <p:childTnLst>
+                        <p:par>
+                          <p:cTn fill="hold">
+                            <p:stCondLst>
+                              <p:cond delay="0"/>
+                            </p:stCondLst>
+                            <p:childTnLst>
+                              <p:par>
+                                <p:cTn fill="hold" nodeType="clickEffect" presetClass="entr" presetID="10" presetSubtype="0">
+                                  <p:stCondLst>
+                                    <p:cond delay="0"/>
+                                  </p:stCondLst>
+                                  <p:childTnLst>
+                                    <p:set>
+                                      <p:cBhvr>
+                                        <p:cTn dur="1" fill="hold">
+                                          <p:stCondLst>
+                                            <p:cond delay="0"/>
+                                          </p:stCondLst>
+                                        </p:cTn>
+                                        <p:tgtEl>
+                                          <p:spTgt spid="131"/>
+                                        </p:tgtEl>
+                                        <p:attrNameLst>
+                                          <p:attrName>style.visibility</p:attrName>
+                                        </p:attrNameLst>
+                                      </p:cBhvr>
+                                      <p:to>
+                                        <p:strVal val="visible"/>
+                                      </p:to>
+                                    </p:set>
+                                    <p:animEffect filter="fade" transition="in">
+                                      <p:cBhvr>
+                                        <p:cTn dur="1000"/>
+                                        <p:tgtEl>
+                                          <p:spTgt spid="131"/>
+                                        </p:tgtEl>
+                                      </p:cBhvr>
+                                    </p:animEffect>
+                                  </p:childTnLst>
+                                </p:cTn>
+                              </p:par>
+                            </p:childTnLst>
+                          </p:cTn>
+                        </p:par>
+                      </p:childTnLst>
+                    </p:cTn>
+                  </p:par>
+                  <p:par>
+                    <p:cTn fill="hold">
+                      <p:stCondLst>
+                        <p:cond delay="indefinite"/>
+                      </p:stCondLst>
+                      <p:childTnLst>
+                        <p:par>
+                          <p:cTn fill="hold">
+                            <p:stCondLst>
+                              <p:cond delay="0"/>
+                            </p:stCondLst>
+                            <p:childTnLst>
+                              <p:par>
+                                <p:cTn fill="hold" nodeType="clickEffect" presetClass="entr" presetID="10" presetSubtype="0">
+                                  <p:stCondLst>
+                                    <p:cond delay="0"/>
+                                  </p:stCondLst>
+                                  <p:childTnLst>
+                                    <p:set>
+                                      <p:cBhvr>
+                                        <p:cTn dur="1" fill="hold">
+                                          <p:stCondLst>
+                                            <p:cond delay="0"/>
+                                          </p:stCondLst>
+                                        </p:cTn>
+                                        <p:tgtEl>
+                                          <p:spTgt spid="132"/>
+                                        </p:tgtEl>
+                                        <p:attrNameLst>
+                                          <p:attrName>style.visibility</p:attrName>
+                                        </p:attrNameLst>
+                                      </p:cBhvr>
+                                      <p:to>
+                                        <p:strVal val="visible"/>
+                                      </p:to>
+                                    </p:set>
+                                    <p:animEffect filter="fade" transition="in">
+                                      <p:cBhvr>
+                                        <p:cTn dur="1000"/>
+                                        <p:tgtEl>
+                                          <p:spTgt spid="132"/>
+                                        </p:tgtEl>
+                                      </p:cBhvr>
+                                    </p:animEffect>
+                                  </p:childTnLst>
+                                </p:cTn>
+                              </p:par>
+                            </p:childTnLst>
+                          </p:cTn>
+                        </p:par>
+                      </p:childTnLst>
+                    </p:cTn>
+                  </p:par>
+                  <p:par>
+                    <p:cTn fill="hold">
+                      <p:stCondLst>
+                        <p:cond delay="indefinite"/>
+                      </p:stCondLst>
+                      <p:childTnLst>
+                        <p:par>
+                          <p:cTn fill="hold">
+                            <p:stCondLst>
+                              <p:cond delay="0"/>
+                            </p:stCondLst>
+                            <p:childTnLst>
+                              <p:par>
+                                <p:cTn fill="hold" nodeType="clickEffect" presetClass="entr" presetID="10" presetSubtype="0">
+                                  <p:stCondLst>
+                                    <p:cond delay="0"/>
+                                  </p:stCondLst>
+                                  <p:childTnLst>
+                                    <p:set>
+                                      <p:cBhvr>
+                                        <p:cTn dur="1" fill="hold">
+                                          <p:stCondLst>
+                                            <p:cond delay="0"/>
+                                          </p:stCondLst>
+                                        </p:cTn>
+                                        <p:tgtEl>
+                                          <p:spTgt spid="133"/>
+                                        </p:tgtEl>
+                                        <p:attrNameLst>
+                                          <p:attrName>style.visibility</p:attrName>
+                                        </p:attrNameLst>
+                                      </p:cBhvr>
+                                      <p:to>
+                                        <p:strVal val="visible"/>
+                                      </p:to>
+                                    </p:set>
+                                    <p:animEffect filter="fade" transition="in">
+                                      <p:cBhvr>
+                                        <p:cTn dur="1000"/>
+                                        <p:tgtEl>
+                                          <p:spTgt spid="133"/>
+                                        </p:tgtEl>
+                                      </p:cBhvr>
+                                    </p:animEffect>
+                                  </p:childTnLst>
+                                </p:cTn>
+                              </p:par>
+                            </p:childTnLst>
+                          </p:cTn>
+                        </p:par>
+                      </p:childTnLst>
+                    </p:cTn>
+                  </p:par>
+                  <p:par>
+                    <p:cTn fill="hold">
+                      <p:stCondLst>
+                        <p:cond delay="indefinite"/>
+                      </p:stCondLst>
+                      <p:childTnLst>
+                        <p:par>
+                          <p:cTn fill="hold">
+                            <p:stCondLst>
+                              <p:cond delay="0"/>
+                            </p:stCondLst>
+                            <p:childTnLst>
+                              <p:par>
+                                <p:cTn fill="hold" nodeType="clickEffect" presetClass="entr" presetID="10" presetSubtype="0">
+                                  <p:stCondLst>
+                                    <p:cond delay="0"/>
+                                  </p:stCondLst>
+                                  <p:childTnLst>
+                                    <p:set>
+                                      <p:cBhvr>
+                                        <p:cTn dur="1" fill="hold">
+                                          <p:stCondLst>
+                                            <p:cond delay="0"/>
+                                          </p:stCondLst>
+                                        </p:cTn>
+                                        <p:tgtEl>
+                                          <p:spTgt spid="134"/>
+                                        </p:tgtEl>
+                                        <p:attrNameLst>
+                                          <p:attrName>style.visibility</p:attrName>
+                                        </p:attrNameLst>
+                                      </p:cBhvr>
+                                      <p:to>
+                                        <p:strVal val="visible"/>
+                                      </p:to>
+                                    </p:set>
+                                    <p:animEffect filter="fade" transition="in">
+                                      <p:cBhvr>
+                                        <p:cTn dur="1000"/>
+                                        <p:tgtEl>
+                                          <p:spTgt spid="134"/>
+                                        </p:tgtEl>
+                                      </p:cBhvr>
+                                    </p:animEffect>
+                                  </p:childTnLst>
+                                </p:cTn>
+                              </p:par>
+                            </p:childTnLst>
+                          </p:cTn>
+                        </p:par>
+                      </p:childTnLst>
+                    </p:cTn>
+                  </p:par>
+                  <p:par>
+                    <p:cTn fill="hold">
+                      <p:stCondLst>
+                        <p:cond delay="indefinite"/>
+                      </p:stCondLst>
+                      <p:childTnLst>
+                        <p:par>
+                          <p:cTn fill="hold">
+                            <p:stCondLst>
+                              <p:cond delay="0"/>
+                            </p:stCondLst>
+                            <p:childTnLst>
+                              <p:par>
+                                <p:cTn fill="hold" nodeType="clickEffect" presetClass="entr" presetID="10" presetSubtype="0">
+                                  <p:stCondLst>
+                                    <p:cond delay="0"/>
+                                  </p:stCondLst>
+                                  <p:childTnLst>
+                                    <p:set>
+                                      <p:cBhvr>
+                                        <p:cTn dur="1" fill="hold">
+                                          <p:stCondLst>
+                                            <p:cond delay="0"/>
+                                          </p:stCondLst>
+                                        </p:cTn>
+                                        <p:tgtEl>
+                                          <p:spTgt spid="135"/>
+                                        </p:tgtEl>
+                                        <p:attrNameLst>
+                                          <p:attrName>style.visibility</p:attrName>
+                                        </p:attrNameLst>
+                                      </p:cBhvr>
+                                      <p:to>
+                                        <p:strVal val="visible"/>
+                                      </p:to>
+                                    </p:set>
+                                    <p:animEffect filter="fade" transition="in">
+                                      <p:cBhvr>
+                                        <p:cTn dur="1000"/>
+                                        <p:tgtEl>
+                                          <p:spTgt spid="135"/>
+                                        </p:tgtEl>
+                                      </p:cBhvr>
+                                    </p:animEffect>
+                                  </p:childTnLst>
+                                </p:cTn>
+                              </p:par>
+                            </p:childTnLst>
+                          </p:cTn>
+                        </p:par>
+                      </p:childTnLst>
+                    </p:cTn>
+                  </p:par>
+                  <p:par>
+                    <p:cTn fill="hold">
+                      <p:stCondLst>
+                        <p:cond delay="indefinite"/>
+                      </p:stCondLst>
+                      <p:childTnLst>
+                        <p:par>
+                          <p:cTn fill="hold">
+                            <p:stCondLst>
+                              <p:cond delay="0"/>
+                            </p:stCondLst>
+                            <p:childTnLst>
+                              <p:par>
+                                <p:cTn fill="hold" nodeType="clickEffect" presetClass="entr" presetID="10" presetSubtype="0">
+                                  <p:stCondLst>
+                                    <p:cond delay="0"/>
+                                  </p:stCondLst>
+                                  <p:childTnLst>
+                                    <p:set>
+                                      <p:cBhvr>
+                                        <p:cTn dur="1" fill="hold">
+                                          <p:stCondLst>
+                                            <p:cond delay="0"/>
+                                          </p:stCondLst>
+                                        </p:cTn>
+                                        <p:tgtEl>
+                                          <p:spTgt spid="136"/>
+                                        </p:tgtEl>
+                                        <p:attrNameLst>
+                                          <p:attrName>style.visibility</p:attrName>
+                                        </p:attrNameLst>
+                                      </p:cBhvr>
+                                      <p:to>
+                                        <p:strVal val="visible"/>
+                                      </p:to>
+                                    </p:set>
+                                    <p:animEffect filter="fade" transition="in">
+                                      <p:cBhvr>
+                                        <p:cTn dur="1000"/>
+                                        <p:tgtEl>
+                                          <p:spTgt spid="136"/>
+                                        </p:tgtEl>
+                                      </p:cBhvr>
+                                    </p:animEffect>
+                                  </p:childTnLst>
+                                </p:cTn>
+                              </p:par>
+                            </p:childTnLst>
+                          </p:cTn>
+                        </p:par>
+                      </p:childTnLst>
+                    </p:cTn>
+                  </p:par>
+                </p:childTnLst>
+              </p:cTn>
+              <p:prevCondLst>
+                <p:cond evt="onPrev">
+                  <p:tgtEl>
+                    <p:sldTgt/>
+                  </p:tgtEl>
+                </p:cond>
+              </p:prevCondLst>
+              <p:nextCondLst>
+                <p:cond evt="onNext">
+                  <p:tgtEl>
+                    <p:sldTgt/>
+                  </p:tgtEl>
+                </p:cond>
+              </p:nextCondLst>
+            </p:seq>
+          </p:childTnLst>
+        </p:cTn>
+      </p:par>
+    </p:tnLst>
+  </p:timing>
+</p:sld>
+</file>
+
 <file path=ppt/theme/theme1.xml><?xml version="1.0" encoding="utf-8"?>
 <a:theme xmlns:a="http://schemas.openxmlformats.org/drawingml/2006/main" xmlns:r="http://schemas.openxmlformats.org/officeDocument/2006/relationships" name="Simple Light">
   <a:themeElements>

</xml_diff>

<commit_message>
added DA cert domain 1 6 and 7
</commit_message>
<xml_diff>
--- a/public/Exam Notes/6-Introduction to data collection systems.pptx
+++ b/public/Exam Notes/6-Introduction to data collection systems.pptx
@@ -11643,8 +11643,8 @@
         </p:blipFill>
         <p:spPr>
           <a:xfrm>
-            <a:off x="1456825" y="3701224"/>
-            <a:ext cx="5007502" cy="990125"/>
+            <a:off x="1384313" y="3684900"/>
+            <a:ext cx="5392176" cy="1051625"/>
           </a:xfrm>
           <a:prstGeom prst="rect">
             <a:avLst/>
@@ -11850,41 +11850,6 @@
                                         <p:cTn dur="1000"/>
                                         <p:tgtEl>
                                           <p:spTgt spid="89"/>
-                                        </p:tgtEl>
-                                      </p:cBhvr>
-                                    </p:animEffect>
-                                  </p:childTnLst>
-                                </p:cTn>
-                              </p:par>
-                              <p:par>
-                                <p:cTn fill="hold" nodeType="withEffect" presetClass="entr" presetID="10" presetSubtype="0">
-                                  <p:stCondLst>
-                                    <p:cond delay="0"/>
-                                  </p:stCondLst>
-                                  <p:childTnLst>
-                                    <p:set>
-                                      <p:cBhvr>
-                                        <p:cTn dur="1" fill="hold">
-                                          <p:stCondLst>
-                                            <p:cond delay="0"/>
-                                          </p:stCondLst>
-                                        </p:cTn>
-                                        <p:tgtEl>
-                                          <p:spTgt spid="91"/>
-                                        </p:tgtEl>
-                                        <p:attrNameLst>
-                                          <p:attrName>style.visibility</p:attrName>
-                                        </p:attrNameLst>
-                                      </p:cBhvr>
-                                      <p:to>
-                                        <p:strVal val="visible"/>
-                                      </p:to>
-                                    </p:set>
-                                    <p:animEffect filter="fade" transition="in">
-                                      <p:cBhvr>
-                                        <p:cTn dur="1000"/>
-                                        <p:tgtEl>
-                                          <p:spTgt spid="91"/>
                                         </p:tgtEl>
                                       </p:cBhvr>
                                     </p:animEffect>
@@ -14902,6 +14867,285 @@
 </file>
 
 <file path=ppt/theme/theme1.xml><?xml version="1.0" encoding="utf-8"?>
+<a:theme xmlns:a="http://schemas.openxmlformats.org/drawingml/2006/main" xmlns:r="http://schemas.openxmlformats.org/officeDocument/2006/relationships">
+  <a:themeElements>
+    <a:clrScheme name="Default">
+      <a:dk1>
+        <a:srgbClr val="000000"/>
+      </a:dk1>
+      <a:lt1>
+        <a:srgbClr val="FFFFFF"/>
+      </a:lt1>
+      <a:dk2>
+        <a:srgbClr val="158158"/>
+      </a:dk2>
+      <a:lt2>
+        <a:srgbClr val="F3F3F3"/>
+      </a:lt2>
+      <a:accent1>
+        <a:srgbClr val="058DC7"/>
+      </a:accent1>
+      <a:accent2>
+        <a:srgbClr val="50B432"/>
+      </a:accent2>
+      <a:accent3>
+        <a:srgbClr val="ED561B"/>
+      </a:accent3>
+      <a:accent4>
+        <a:srgbClr val="EDEF00"/>
+      </a:accent4>
+      <a:accent5>
+        <a:srgbClr val="24CBE5"/>
+      </a:accent5>
+      <a:accent6>
+        <a:srgbClr val="64E572"/>
+      </a:accent6>
+      <a:hlink>
+        <a:srgbClr val="2200CC"/>
+      </a:hlink>
+      <a:folHlink>
+        <a:srgbClr val="551A8B"/>
+      </a:folHlink>
+    </a:clrScheme>
+    <a:fontScheme name="Office">
+      <a:majorFont>
+        <a:latin typeface="Arial"/>
+        <a:ea typeface=""/>
+        <a:cs typeface=""/>
+        <a:font script="Jpan" typeface="ＭＳ Ｐゴシック"/>
+        <a:font script="Hang" typeface="맑은 고딕"/>
+        <a:font script="Hans" typeface="宋体"/>
+        <a:font script="Hant" typeface="新細明體"/>
+        <a:font script="Arab" typeface="Times New Roman"/>
+        <a:font script="Hebr" typeface="Times New Roman"/>
+        <a:font script="Thai" typeface="Angsana New"/>
+        <a:font script="Ethi" typeface="Nyala"/>
+        <a:font script="Beng" typeface="Vrinda"/>
+        <a:font script="Gujr" typeface="Shruti"/>
+        <a:font script="Khmr" typeface="MoolBoran"/>
+        <a:font script="Knda" typeface="Tunga"/>
+        <a:font script="Guru" typeface="Raavi"/>
+        <a:font script="Cans" typeface="Euphemia"/>
+        <a:font script="Cher" typeface="Plantagenet Cherokee"/>
+        <a:font script="Yiii" typeface="Microsoft Yi Baiti"/>
+        <a:font script="Tibt" typeface="Microsoft Himalaya"/>
+        <a:font script="Thaa" typeface="MV Boli"/>
+        <a:font script="Deva" typeface="Mangal"/>
+        <a:font script="Telu" typeface="Gautami"/>
+        <a:font script="Taml" typeface="Latha"/>
+        <a:font script="Syrc" typeface="Estrangelo Edessa"/>
+        <a:font script="Orya" typeface="Kalinga"/>
+        <a:font script="Mlym" typeface="Kartika"/>
+        <a:font script="Laoo" typeface="DokChampa"/>
+        <a:font script="Sinh" typeface="Iskoola Pota"/>
+        <a:font script="Mong" typeface="Mongolian Baiti"/>
+        <a:font script="Viet" typeface="Times New Roman"/>
+        <a:font script="Uigh" typeface="Microsoft Uighur"/>
+        <a:font script="Geor" typeface="Sylfaen"/>
+      </a:majorFont>
+      <a:minorFont>
+        <a:latin typeface="Arial"/>
+        <a:ea typeface=""/>
+        <a:cs typeface=""/>
+        <a:font script="Jpan" typeface="ＭＳ Ｐゴシック"/>
+        <a:font script="Hang" typeface="맑은 고딕"/>
+        <a:font script="Hans" typeface="宋体"/>
+        <a:font script="Hant" typeface="新細明體"/>
+        <a:font script="Arab" typeface="Arial"/>
+        <a:font script="Hebr" typeface="Arial"/>
+        <a:font script="Thai" typeface="Cordia New"/>
+        <a:font script="Ethi" typeface="Nyala"/>
+        <a:font script="Beng" typeface="Vrinda"/>
+        <a:font script="Gujr" typeface="Shruti"/>
+        <a:font script="Khmr" typeface="DaunPenh"/>
+        <a:font script="Knda" typeface="Tunga"/>
+        <a:font script="Guru" typeface="Raavi"/>
+        <a:font script="Cans" typeface="Euphemia"/>
+        <a:font script="Cher" typeface="Plantagenet Cherokee"/>
+        <a:font script="Yiii" typeface="Microsoft Yi Baiti"/>
+        <a:font script="Tibt" typeface="Microsoft Himalaya"/>
+        <a:font script="Thaa" typeface="MV Boli"/>
+        <a:font script="Deva" typeface="Mangal"/>
+        <a:font script="Telu" typeface="Gautami"/>
+        <a:font script="Taml" typeface="Latha"/>
+        <a:font script="Syrc" typeface="Estrangelo Edessa"/>
+        <a:font script="Orya" typeface="Kalinga"/>
+        <a:font script="Mlym" typeface="Kartika"/>
+        <a:font script="Laoo" typeface="DokChampa"/>
+        <a:font script="Sinh" typeface="Iskoola Pota"/>
+        <a:font script="Mong" typeface="Mongolian Baiti"/>
+        <a:font script="Viet" typeface="Arial"/>
+        <a:font script="Uigh" typeface="Microsoft Uighur"/>
+        <a:font script="Geor" typeface="Sylfaen"/>
+      </a:minorFont>
+    </a:fontScheme>
+    <a:fmtScheme name="Office">
+      <a:fillStyleLst>
+        <a:solidFill>
+          <a:schemeClr val="phClr"/>
+        </a:solidFill>
+        <a:gradFill rotWithShape="1">
+          <a:gsLst>
+            <a:gs pos="0">
+              <a:schemeClr val="phClr">
+                <a:tint val="50000"/>
+                <a:satMod val="300000"/>
+              </a:schemeClr>
+            </a:gs>
+            <a:gs pos="35000">
+              <a:schemeClr val="phClr">
+                <a:tint val="37000"/>
+                <a:satMod val="300000"/>
+              </a:schemeClr>
+            </a:gs>
+            <a:gs pos="100000">
+              <a:schemeClr val="phClr">
+                <a:tint val="15000"/>
+                <a:satMod val="350000"/>
+              </a:schemeClr>
+            </a:gs>
+          </a:gsLst>
+          <a:lin ang="16200000" scaled="1"/>
+        </a:gradFill>
+        <a:gradFill rotWithShape="1">
+          <a:gsLst>
+            <a:gs pos="0">
+              <a:schemeClr val="phClr">
+                <a:tint val="100000"/>
+                <a:shade val="100000"/>
+                <a:satMod val="130000"/>
+              </a:schemeClr>
+            </a:gs>
+            <a:gs pos="100000">
+              <a:schemeClr val="phClr">
+                <a:tint val="50000"/>
+                <a:shade val="100000"/>
+                <a:satMod val="350000"/>
+              </a:schemeClr>
+            </a:gs>
+          </a:gsLst>
+          <a:lin ang="16200000" scaled="0"/>
+        </a:gradFill>
+      </a:fillStyleLst>
+      <a:lnStyleLst>
+        <a:ln w="9525" cap="flat" cmpd="sng" algn="ctr">
+          <a:solidFill>
+            <a:schemeClr val="phClr">
+              <a:shade val="95000"/>
+              <a:satMod val="105000"/>
+            </a:schemeClr>
+          </a:solidFill>
+          <a:prstDash val="solid"/>
+        </a:ln>
+        <a:ln w="25400" cap="flat" cmpd="sng" algn="ctr">
+          <a:solidFill>
+            <a:schemeClr val="phClr"/>
+          </a:solidFill>
+          <a:prstDash val="solid"/>
+        </a:ln>
+        <a:ln w="38100" cap="flat" cmpd="sng" algn="ctr">
+          <a:solidFill>
+            <a:schemeClr val="phClr"/>
+          </a:solidFill>
+          <a:prstDash val="solid"/>
+        </a:ln>
+      </a:lnStyleLst>
+      <a:effectStyleLst>
+        <a:effectStyle>
+          <a:effectLst>
+            <a:outerShdw blurRad="40000" dist="20000" dir="5400000" rotWithShape="0">
+              <a:srgbClr val="000000">
+                <a:alpha val="38000"/>
+              </a:srgbClr>
+            </a:outerShdw>
+          </a:effectLst>
+        </a:effectStyle>
+        <a:effectStyle>
+          <a:effectLst>
+            <a:outerShdw blurRad="40000" dist="23000" dir="5400000" rotWithShape="0">
+              <a:srgbClr val="000000">
+                <a:alpha val="35000"/>
+              </a:srgbClr>
+            </a:outerShdw>
+          </a:effectLst>
+        </a:effectStyle>
+        <a:effectStyle>
+          <a:effectLst>
+            <a:outerShdw blurRad="40000" dist="23000" dir="5400000" rotWithShape="0">
+              <a:srgbClr val="000000">
+                <a:alpha val="35000"/>
+              </a:srgbClr>
+            </a:outerShdw>
+          </a:effectLst>
+          <a:scene3d>
+            <a:camera prst="orthographicFront">
+              <a:rot lat="0" lon="0" rev="0"/>
+            </a:camera>
+            <a:lightRig rig="threePt" dir="t">
+              <a:rot lat="0" lon="0" rev="1200000"/>
+            </a:lightRig>
+          </a:scene3d>
+          <a:sp3d>
+            <a:bevelT w="63500" h="25400"/>
+          </a:sp3d>
+        </a:effectStyle>
+      </a:effectStyleLst>
+      <a:bgFillStyleLst>
+        <a:solidFill>
+          <a:schemeClr val="phClr"/>
+        </a:solidFill>
+        <a:gradFill rotWithShape="1">
+          <a:gsLst>
+            <a:gs pos="0">
+              <a:schemeClr val="phClr">
+                <a:tint val="40000"/>
+                <a:satMod val="350000"/>
+              </a:schemeClr>
+            </a:gs>
+            <a:gs pos="40000">
+              <a:schemeClr val="phClr">
+                <a:tint val="45000"/>
+                <a:shade val="99000"/>
+                <a:satMod val="350000"/>
+              </a:schemeClr>
+            </a:gs>
+            <a:gs pos="100000">
+              <a:schemeClr val="phClr">
+                <a:shade val="20000"/>
+                <a:satMod val="255000"/>
+              </a:schemeClr>
+            </a:gs>
+          </a:gsLst>
+          <a:path path="circle">
+            <a:fillToRect l="50000" t="-80000" r="50000" b="180000"/>
+          </a:path>
+        </a:gradFill>
+        <a:gradFill rotWithShape="1">
+          <a:gsLst>
+            <a:gs pos="0">
+              <a:schemeClr val="phClr">
+                <a:tint val="80000"/>
+                <a:satMod val="300000"/>
+              </a:schemeClr>
+            </a:gs>
+            <a:gs pos="100000">
+              <a:schemeClr val="phClr">
+                <a:shade val="30000"/>
+                <a:satMod val="200000"/>
+              </a:schemeClr>
+            </a:gs>
+          </a:gsLst>
+          <a:path path="circle">
+            <a:fillToRect l="50000" t="50000" r="50000" b="50000"/>
+          </a:path>
+        </a:gradFill>
+      </a:bgFillStyleLst>
+    </a:fmtScheme>
+  </a:themeElements>
+</a:theme>
+</file>
+
+<file path=ppt/theme/theme2.xml><?xml version="1.0" encoding="utf-8"?>
 <a:theme xmlns:a="http://schemas.openxmlformats.org/drawingml/2006/main" xmlns:r="http://schemas.openxmlformats.org/officeDocument/2006/relationships" name="Simple Light">
   <a:themeElements>
     <a:clrScheme name="Simple Light">
@@ -15178,283 +15422,4 @@
     </a:fmtScheme>
   </a:themeElements>
 </a:theme>
-</file>
-
-<file path=ppt/theme/theme2.xml><?xml version="1.0" encoding="utf-8"?>
-<a:theme xmlns:a="http://schemas.openxmlformats.org/drawingml/2006/main" xmlns:r="http://schemas.openxmlformats.org/officeDocument/2006/relationships">
-  <a:themeElements>
-    <a:clrScheme name="Default">
-      <a:dk1>
-        <a:srgbClr val="000000"/>
-      </a:dk1>
-      <a:lt1>
-        <a:srgbClr val="FFFFFF"/>
-      </a:lt1>
-      <a:dk2>
-        <a:srgbClr val="158158"/>
-      </a:dk2>
-      <a:lt2>
-        <a:srgbClr val="F3F3F3"/>
-      </a:lt2>
-      <a:accent1>
-        <a:srgbClr val="058DC7"/>
-      </a:accent1>
-      <a:accent2>
-        <a:srgbClr val="50B432"/>
-      </a:accent2>
-      <a:accent3>
-        <a:srgbClr val="ED561B"/>
-      </a:accent3>
-      <a:accent4>
-        <a:srgbClr val="EDEF00"/>
-      </a:accent4>
-      <a:accent5>
-        <a:srgbClr val="24CBE5"/>
-      </a:accent5>
-      <a:accent6>
-        <a:srgbClr val="64E572"/>
-      </a:accent6>
-      <a:hlink>
-        <a:srgbClr val="2200CC"/>
-      </a:hlink>
-      <a:folHlink>
-        <a:srgbClr val="551A8B"/>
-      </a:folHlink>
-    </a:clrScheme>
-    <a:fontScheme name="Office">
-      <a:majorFont>
-        <a:latin typeface="Arial"/>
-        <a:ea typeface=""/>
-        <a:cs typeface=""/>
-        <a:font script="Jpan" typeface="ＭＳ Ｐゴシック"/>
-        <a:font script="Hang" typeface="맑은 고딕"/>
-        <a:font script="Hans" typeface="宋体"/>
-        <a:font script="Hant" typeface="新細明體"/>
-        <a:font script="Arab" typeface="Times New Roman"/>
-        <a:font script="Hebr" typeface="Times New Roman"/>
-        <a:font script="Thai" typeface="Angsana New"/>
-        <a:font script="Ethi" typeface="Nyala"/>
-        <a:font script="Beng" typeface="Vrinda"/>
-        <a:font script="Gujr" typeface="Shruti"/>
-        <a:font script="Khmr" typeface="MoolBoran"/>
-        <a:font script="Knda" typeface="Tunga"/>
-        <a:font script="Guru" typeface="Raavi"/>
-        <a:font script="Cans" typeface="Euphemia"/>
-        <a:font script="Cher" typeface="Plantagenet Cherokee"/>
-        <a:font script="Yiii" typeface="Microsoft Yi Baiti"/>
-        <a:font script="Tibt" typeface="Microsoft Himalaya"/>
-        <a:font script="Thaa" typeface="MV Boli"/>
-        <a:font script="Deva" typeface="Mangal"/>
-        <a:font script="Telu" typeface="Gautami"/>
-        <a:font script="Taml" typeface="Latha"/>
-        <a:font script="Syrc" typeface="Estrangelo Edessa"/>
-        <a:font script="Orya" typeface="Kalinga"/>
-        <a:font script="Mlym" typeface="Kartika"/>
-        <a:font script="Laoo" typeface="DokChampa"/>
-        <a:font script="Sinh" typeface="Iskoola Pota"/>
-        <a:font script="Mong" typeface="Mongolian Baiti"/>
-        <a:font script="Viet" typeface="Times New Roman"/>
-        <a:font script="Uigh" typeface="Microsoft Uighur"/>
-        <a:font script="Geor" typeface="Sylfaen"/>
-      </a:majorFont>
-      <a:minorFont>
-        <a:latin typeface="Arial"/>
-        <a:ea typeface=""/>
-        <a:cs typeface=""/>
-        <a:font script="Jpan" typeface="ＭＳ Ｐゴシック"/>
-        <a:font script="Hang" typeface="맑은 고딕"/>
-        <a:font script="Hans" typeface="宋体"/>
-        <a:font script="Hant" typeface="新細明體"/>
-        <a:font script="Arab" typeface="Arial"/>
-        <a:font script="Hebr" typeface="Arial"/>
-        <a:font script="Thai" typeface="Cordia New"/>
-        <a:font script="Ethi" typeface="Nyala"/>
-        <a:font script="Beng" typeface="Vrinda"/>
-        <a:font script="Gujr" typeface="Shruti"/>
-        <a:font script="Khmr" typeface="DaunPenh"/>
-        <a:font script="Knda" typeface="Tunga"/>
-        <a:font script="Guru" typeface="Raavi"/>
-        <a:font script="Cans" typeface="Euphemia"/>
-        <a:font script="Cher" typeface="Plantagenet Cherokee"/>
-        <a:font script="Yiii" typeface="Microsoft Yi Baiti"/>
-        <a:font script="Tibt" typeface="Microsoft Himalaya"/>
-        <a:font script="Thaa" typeface="MV Boli"/>
-        <a:font script="Deva" typeface="Mangal"/>
-        <a:font script="Telu" typeface="Gautami"/>
-        <a:font script="Taml" typeface="Latha"/>
-        <a:font script="Syrc" typeface="Estrangelo Edessa"/>
-        <a:font script="Orya" typeface="Kalinga"/>
-        <a:font script="Mlym" typeface="Kartika"/>
-        <a:font script="Laoo" typeface="DokChampa"/>
-        <a:font script="Sinh" typeface="Iskoola Pota"/>
-        <a:font script="Mong" typeface="Mongolian Baiti"/>
-        <a:font script="Viet" typeface="Arial"/>
-        <a:font script="Uigh" typeface="Microsoft Uighur"/>
-        <a:font script="Geor" typeface="Sylfaen"/>
-      </a:minorFont>
-    </a:fontScheme>
-    <a:fmtScheme name="Office">
-      <a:fillStyleLst>
-        <a:solidFill>
-          <a:schemeClr val="phClr"/>
-        </a:solidFill>
-        <a:gradFill rotWithShape="1">
-          <a:gsLst>
-            <a:gs pos="0">
-              <a:schemeClr val="phClr">
-                <a:tint val="50000"/>
-                <a:satMod val="300000"/>
-              </a:schemeClr>
-            </a:gs>
-            <a:gs pos="35000">
-              <a:schemeClr val="phClr">
-                <a:tint val="37000"/>
-                <a:satMod val="300000"/>
-              </a:schemeClr>
-            </a:gs>
-            <a:gs pos="100000">
-              <a:schemeClr val="phClr">
-                <a:tint val="15000"/>
-                <a:satMod val="350000"/>
-              </a:schemeClr>
-            </a:gs>
-          </a:gsLst>
-          <a:lin ang="16200000" scaled="1"/>
-        </a:gradFill>
-        <a:gradFill rotWithShape="1">
-          <a:gsLst>
-            <a:gs pos="0">
-              <a:schemeClr val="phClr">
-                <a:tint val="100000"/>
-                <a:shade val="100000"/>
-                <a:satMod val="130000"/>
-              </a:schemeClr>
-            </a:gs>
-            <a:gs pos="100000">
-              <a:schemeClr val="phClr">
-                <a:tint val="50000"/>
-                <a:shade val="100000"/>
-                <a:satMod val="350000"/>
-              </a:schemeClr>
-            </a:gs>
-          </a:gsLst>
-          <a:lin ang="16200000" scaled="0"/>
-        </a:gradFill>
-      </a:fillStyleLst>
-      <a:lnStyleLst>
-        <a:ln w="9525" cap="flat" cmpd="sng" algn="ctr">
-          <a:solidFill>
-            <a:schemeClr val="phClr">
-              <a:shade val="95000"/>
-              <a:satMod val="105000"/>
-            </a:schemeClr>
-          </a:solidFill>
-          <a:prstDash val="solid"/>
-        </a:ln>
-        <a:ln w="25400" cap="flat" cmpd="sng" algn="ctr">
-          <a:solidFill>
-            <a:schemeClr val="phClr"/>
-          </a:solidFill>
-          <a:prstDash val="solid"/>
-        </a:ln>
-        <a:ln w="38100" cap="flat" cmpd="sng" algn="ctr">
-          <a:solidFill>
-            <a:schemeClr val="phClr"/>
-          </a:solidFill>
-          <a:prstDash val="solid"/>
-        </a:ln>
-      </a:lnStyleLst>
-      <a:effectStyleLst>
-        <a:effectStyle>
-          <a:effectLst>
-            <a:outerShdw blurRad="40000" dist="20000" dir="5400000" rotWithShape="0">
-              <a:srgbClr val="000000">
-                <a:alpha val="38000"/>
-              </a:srgbClr>
-            </a:outerShdw>
-          </a:effectLst>
-        </a:effectStyle>
-        <a:effectStyle>
-          <a:effectLst>
-            <a:outerShdw blurRad="40000" dist="23000" dir="5400000" rotWithShape="0">
-              <a:srgbClr val="000000">
-                <a:alpha val="35000"/>
-              </a:srgbClr>
-            </a:outerShdw>
-          </a:effectLst>
-        </a:effectStyle>
-        <a:effectStyle>
-          <a:effectLst>
-            <a:outerShdw blurRad="40000" dist="23000" dir="5400000" rotWithShape="0">
-              <a:srgbClr val="000000">
-                <a:alpha val="35000"/>
-              </a:srgbClr>
-            </a:outerShdw>
-          </a:effectLst>
-          <a:scene3d>
-            <a:camera prst="orthographicFront">
-              <a:rot lat="0" lon="0" rev="0"/>
-            </a:camera>
-            <a:lightRig rig="threePt" dir="t">
-              <a:rot lat="0" lon="0" rev="1200000"/>
-            </a:lightRig>
-          </a:scene3d>
-          <a:sp3d>
-            <a:bevelT w="63500" h="25400"/>
-          </a:sp3d>
-        </a:effectStyle>
-      </a:effectStyleLst>
-      <a:bgFillStyleLst>
-        <a:solidFill>
-          <a:schemeClr val="phClr"/>
-        </a:solidFill>
-        <a:gradFill rotWithShape="1">
-          <a:gsLst>
-            <a:gs pos="0">
-              <a:schemeClr val="phClr">
-                <a:tint val="40000"/>
-                <a:satMod val="350000"/>
-              </a:schemeClr>
-            </a:gs>
-            <a:gs pos="40000">
-              <a:schemeClr val="phClr">
-                <a:tint val="45000"/>
-                <a:shade val="99000"/>
-                <a:satMod val="350000"/>
-              </a:schemeClr>
-            </a:gs>
-            <a:gs pos="100000">
-              <a:schemeClr val="phClr">
-                <a:shade val="20000"/>
-                <a:satMod val="255000"/>
-              </a:schemeClr>
-            </a:gs>
-          </a:gsLst>
-          <a:path path="circle">
-            <a:fillToRect l="50000" t="-80000" r="50000" b="180000"/>
-          </a:path>
-        </a:gradFill>
-        <a:gradFill rotWithShape="1">
-          <a:gsLst>
-            <a:gs pos="0">
-              <a:schemeClr val="phClr">
-                <a:tint val="80000"/>
-                <a:satMod val="300000"/>
-              </a:schemeClr>
-            </a:gs>
-            <a:gs pos="100000">
-              <a:schemeClr val="phClr">
-                <a:shade val="30000"/>
-                <a:satMod val="200000"/>
-              </a:schemeClr>
-            </a:gs>
-          </a:gsLst>
-          <a:path path="circle">
-            <a:fillToRect l="50000" t="50000" r="50000" b="50000"/>
-          </a:path>
-        </a:gradFill>
-      </a:bgFillStyleLst>
-    </a:fmtScheme>
-  </a:themeElements>
-</a:theme>
 </file>
</xml_diff>